<commit_message>
Added 10-fold CV for CCP
</commit_message>
<xml_diff>
--- a/Graphs/Decision_tree_self_graph.pptx
+++ b/Graphs/Decision_tree_self_graph.pptx
@@ -5,8 +5,14 @@
     <p:sldMasterId id="2147483648" r:id="rId1"/>
   </p:sldMasterIdLst>
   <p:sldIdLst>
-    <p:sldId id="256" r:id="rId2"/>
-    <p:sldId id="257" r:id="rId3"/>
+    <p:sldId id="260" r:id="rId2"/>
+    <p:sldId id="261" r:id="rId3"/>
+    <p:sldId id="262" r:id="rId4"/>
+    <p:sldId id="258" r:id="rId5"/>
+    <p:sldId id="259" r:id="rId6"/>
+    <p:sldId id="264" r:id="rId7"/>
+    <p:sldId id="263" r:id="rId8"/>
+    <p:sldId id="265" r:id="rId9"/>
   </p:sldIdLst>
   <p:sldSz cx="12192000" cy="6858000"/>
   <p:notesSz cx="6858000" cy="9144000"/>
@@ -3324,1815 +3330,64 @@
       </p:grpSpPr>
       <p:sp>
         <p:nvSpPr>
-          <p:cNvPr id="7" name="Rounded Rectangle 6">
-            <a:extLst>
-              <a:ext uri="{FF2B5EF4-FFF2-40B4-BE49-F238E27FC236}">
-                <a16:creationId xmlns:a16="http://schemas.microsoft.com/office/drawing/2014/main" id="{A325BD5C-D019-3577-943B-EE36DC601F84}"/>
-              </a:ext>
-            </a:extLst>
-          </p:cNvPr>
-          <p:cNvSpPr/>
-          <p:nvPr/>
-        </p:nvSpPr>
-        <p:spPr>
-          <a:xfrm>
-            <a:off x="3633377" y="327005"/>
-            <a:ext cx="914400" cy="302781"/>
-          </a:xfrm>
-          <a:prstGeom prst="roundRect">
-            <a:avLst/>
-          </a:prstGeom>
-          <a:solidFill>
-            <a:schemeClr val="accent2">
-              <a:lumMod val="40000"/>
-              <a:lumOff val="60000"/>
-            </a:schemeClr>
-          </a:solidFill>
-          <a:ln>
-            <a:solidFill>
-              <a:schemeClr val="accent2">
-                <a:lumMod val="40000"/>
-                <a:lumOff val="60000"/>
-              </a:schemeClr>
-            </a:solidFill>
-          </a:ln>
-        </p:spPr>
-        <p:style>
-          <a:lnRef idx="2">
-            <a:schemeClr val="accent1">
-              <a:shade val="50000"/>
-            </a:schemeClr>
-          </a:lnRef>
-          <a:fillRef idx="1">
-            <a:schemeClr val="accent1"/>
-          </a:fillRef>
-          <a:effectRef idx="0">
-            <a:schemeClr val="accent1"/>
-          </a:effectRef>
-          <a:fontRef idx="minor">
-            <a:schemeClr val="lt1"/>
-          </a:fontRef>
-        </p:style>
-        <p:txBody>
-          <a:bodyPr rtlCol="0" anchor="ctr"/>
-          <a:lstStyle/>
-          <a:p>
-            <a:pPr algn="ctr"/>
-            <a:r>
-              <a:rPr lang="en-US" sz="1000" dirty="0">
-                <a:solidFill>
-                  <a:schemeClr val="tx1"/>
-                </a:solidFill>
-              </a:rPr>
-              <a:t>Beds &lt;= 20.7</a:t>
-            </a:r>
-          </a:p>
-        </p:txBody>
-      </p:sp>
-      <p:sp>
-        <p:nvSpPr>
-          <p:cNvPr id="8" name="Rounded Rectangle 7">
-            <a:extLst>
-              <a:ext uri="{FF2B5EF4-FFF2-40B4-BE49-F238E27FC236}">
-                <a16:creationId xmlns:a16="http://schemas.microsoft.com/office/drawing/2014/main" id="{511A4621-9D00-2B7B-6D6A-47651AE205F5}"/>
-              </a:ext>
-            </a:extLst>
-          </p:cNvPr>
-          <p:cNvSpPr/>
-          <p:nvPr/>
-        </p:nvSpPr>
-        <p:spPr>
-          <a:xfrm>
-            <a:off x="1510375" y="789817"/>
-            <a:ext cx="914400" cy="302781"/>
-          </a:xfrm>
-          <a:prstGeom prst="roundRect">
-            <a:avLst/>
-          </a:prstGeom>
-          <a:solidFill>
-            <a:schemeClr val="accent2">
-              <a:lumMod val="75000"/>
-            </a:schemeClr>
-          </a:solidFill>
-          <a:ln>
-            <a:solidFill>
-              <a:schemeClr val="accent2">
-                <a:lumMod val="40000"/>
-                <a:lumOff val="60000"/>
-              </a:schemeClr>
-            </a:solidFill>
-          </a:ln>
-        </p:spPr>
-        <p:style>
-          <a:lnRef idx="2">
-            <a:schemeClr val="accent1">
-              <a:shade val="50000"/>
-            </a:schemeClr>
-          </a:lnRef>
-          <a:fillRef idx="1">
-            <a:schemeClr val="accent1"/>
-          </a:fillRef>
-          <a:effectRef idx="0">
-            <a:schemeClr val="accent1"/>
-          </a:effectRef>
-          <a:fontRef idx="minor">
-            <a:schemeClr val="lt1"/>
-          </a:fontRef>
-        </p:style>
-        <p:txBody>
-          <a:bodyPr rtlCol="0" anchor="ctr"/>
-          <a:lstStyle/>
-          <a:p>
-            <a:pPr algn="ctr"/>
-            <a:r>
-              <a:rPr lang="en-US" sz="1000" dirty="0"/>
-              <a:t>Beds &lt;= 10.3</a:t>
-            </a:r>
-          </a:p>
-        </p:txBody>
-      </p:sp>
-      <p:sp>
-        <p:nvSpPr>
-          <p:cNvPr id="9" name="Rounded Rectangle 8">
-            <a:extLst>
-              <a:ext uri="{FF2B5EF4-FFF2-40B4-BE49-F238E27FC236}">
-                <a16:creationId xmlns:a16="http://schemas.microsoft.com/office/drawing/2014/main" id="{947C3A20-4E53-8180-2197-FD2B351A3F27}"/>
-              </a:ext>
-            </a:extLst>
-          </p:cNvPr>
-          <p:cNvSpPr/>
-          <p:nvPr/>
-        </p:nvSpPr>
-        <p:spPr>
-          <a:xfrm>
-            <a:off x="6287100" y="775978"/>
-            <a:ext cx="914400" cy="302781"/>
-          </a:xfrm>
-          <a:prstGeom prst="roundRect">
-            <a:avLst/>
-          </a:prstGeom>
-          <a:solidFill>
-            <a:schemeClr val="accent1">
-              <a:lumMod val="60000"/>
-              <a:lumOff val="40000"/>
-            </a:schemeClr>
-          </a:solidFill>
-          <a:ln>
-            <a:solidFill>
-              <a:schemeClr val="accent1">
-                <a:lumMod val="60000"/>
-                <a:lumOff val="40000"/>
-              </a:schemeClr>
-            </a:solidFill>
-          </a:ln>
-        </p:spPr>
-        <p:style>
-          <a:lnRef idx="2">
-            <a:schemeClr val="accent1">
-              <a:shade val="50000"/>
-            </a:schemeClr>
-          </a:lnRef>
-          <a:fillRef idx="1">
-            <a:schemeClr val="accent1"/>
-          </a:fillRef>
-          <a:effectRef idx="0">
-            <a:schemeClr val="accent1"/>
-          </a:effectRef>
-          <a:fontRef idx="minor">
-            <a:schemeClr val="lt1"/>
-          </a:fontRef>
-        </p:style>
-        <p:txBody>
-          <a:bodyPr rtlCol="0" anchor="ctr"/>
-          <a:lstStyle/>
-          <a:p>
-            <a:pPr algn="ctr"/>
-            <a:r>
-              <a:rPr lang="en-US" sz="1000" dirty="0"/>
-              <a:t>ICU &lt;= 0.004</a:t>
-            </a:r>
-          </a:p>
-        </p:txBody>
-      </p:sp>
-      <p:sp>
-        <p:nvSpPr>
-          <p:cNvPr id="10" name="Rounded Rectangle 9">
-            <a:extLst>
-              <a:ext uri="{FF2B5EF4-FFF2-40B4-BE49-F238E27FC236}">
-                <a16:creationId xmlns:a16="http://schemas.microsoft.com/office/drawing/2014/main" id="{3F639E4E-2CC0-10EF-8B72-E7F44261533E}"/>
-              </a:ext>
-            </a:extLst>
-          </p:cNvPr>
-          <p:cNvSpPr/>
-          <p:nvPr/>
-        </p:nvSpPr>
-        <p:spPr>
-          <a:xfrm>
-            <a:off x="4384779" y="1892732"/>
-            <a:ext cx="914400" cy="302781"/>
-          </a:xfrm>
-          <a:prstGeom prst="roundRect">
-            <a:avLst/>
-          </a:prstGeom>
-          <a:solidFill>
-            <a:schemeClr val="accent1">
-              <a:lumMod val="60000"/>
-              <a:lumOff val="40000"/>
-            </a:schemeClr>
-          </a:solidFill>
-          <a:ln>
-            <a:solidFill>
-              <a:schemeClr val="accent1">
-                <a:lumMod val="60000"/>
-                <a:lumOff val="40000"/>
-              </a:schemeClr>
-            </a:solidFill>
-          </a:ln>
-        </p:spPr>
-        <p:style>
-          <a:lnRef idx="2">
-            <a:schemeClr val="accent1">
-              <a:shade val="50000"/>
-            </a:schemeClr>
-          </a:lnRef>
-          <a:fillRef idx="1">
-            <a:schemeClr val="accent1"/>
-          </a:fillRef>
-          <a:effectRef idx="0">
-            <a:schemeClr val="accent1"/>
-          </a:effectRef>
-          <a:fontRef idx="minor">
-            <a:schemeClr val="lt1"/>
-          </a:fontRef>
-        </p:style>
-        <p:txBody>
-          <a:bodyPr rtlCol="0" anchor="ctr"/>
-          <a:lstStyle/>
-          <a:p>
-            <a:pPr algn="ctr"/>
-            <a:r>
-              <a:rPr lang="en-US" sz="1000" dirty="0"/>
-              <a:t>Change in cases &lt;= 55.0</a:t>
-            </a:r>
-          </a:p>
-        </p:txBody>
-      </p:sp>
-      <p:sp>
-        <p:nvSpPr>
-          <p:cNvPr id="11" name="Rounded Rectangle 10">
-            <a:extLst>
-              <a:ext uri="{FF2B5EF4-FFF2-40B4-BE49-F238E27FC236}">
-                <a16:creationId xmlns:a16="http://schemas.microsoft.com/office/drawing/2014/main" id="{C9000ED1-D0C1-A14C-2A36-3A57DC72384B}"/>
-              </a:ext>
-            </a:extLst>
-          </p:cNvPr>
-          <p:cNvSpPr/>
-          <p:nvPr/>
-        </p:nvSpPr>
-        <p:spPr>
-          <a:xfrm>
-            <a:off x="4841979" y="1354948"/>
-            <a:ext cx="914400" cy="302781"/>
-          </a:xfrm>
-          <a:prstGeom prst="roundRect">
-            <a:avLst/>
-          </a:prstGeom>
-          <a:solidFill>
-            <a:schemeClr val="accent1">
-              <a:lumMod val="60000"/>
-              <a:lumOff val="40000"/>
-            </a:schemeClr>
-          </a:solidFill>
-          <a:ln>
-            <a:solidFill>
-              <a:schemeClr val="accent1">
-                <a:lumMod val="60000"/>
-                <a:lumOff val="40000"/>
-              </a:schemeClr>
-            </a:solidFill>
-          </a:ln>
-        </p:spPr>
-        <p:style>
-          <a:lnRef idx="2">
-            <a:schemeClr val="accent1">
-              <a:shade val="50000"/>
-            </a:schemeClr>
-          </a:lnRef>
-          <a:fillRef idx="1">
-            <a:schemeClr val="accent1"/>
-          </a:fillRef>
-          <a:effectRef idx="0">
-            <a:schemeClr val="accent1"/>
-          </a:effectRef>
-          <a:fontRef idx="minor">
-            <a:schemeClr val="lt1"/>
-          </a:fontRef>
-        </p:style>
-        <p:txBody>
-          <a:bodyPr rtlCol="0" anchor="ctr"/>
-          <a:lstStyle/>
-          <a:p>
-            <a:pPr algn="ctr"/>
-            <a:r>
-              <a:rPr lang="en-US" sz="1000" dirty="0"/>
-              <a:t>Cases &lt;= 27.5</a:t>
-            </a:r>
-          </a:p>
-        </p:txBody>
-      </p:sp>
-      <p:sp>
-        <p:nvSpPr>
-          <p:cNvPr id="12" name="Rounded Rectangle 11">
-            <a:extLst>
-              <a:ext uri="{FF2B5EF4-FFF2-40B4-BE49-F238E27FC236}">
-                <a16:creationId xmlns:a16="http://schemas.microsoft.com/office/drawing/2014/main" id="{3782F9F7-30F9-225A-8732-849C88559671}"/>
-              </a:ext>
-            </a:extLst>
-          </p:cNvPr>
-          <p:cNvSpPr/>
-          <p:nvPr/>
-        </p:nvSpPr>
-        <p:spPr>
-          <a:xfrm>
-            <a:off x="7878132" y="1354947"/>
-            <a:ext cx="914400" cy="302781"/>
-          </a:xfrm>
-          <a:prstGeom prst="roundRect">
-            <a:avLst/>
-          </a:prstGeom>
-          <a:solidFill>
-            <a:schemeClr val="accent1">
-              <a:lumMod val="60000"/>
-              <a:lumOff val="40000"/>
-            </a:schemeClr>
-          </a:solidFill>
-          <a:ln>
-            <a:solidFill>
-              <a:schemeClr val="accent1">
-                <a:lumMod val="60000"/>
-                <a:lumOff val="40000"/>
-              </a:schemeClr>
-            </a:solidFill>
-          </a:ln>
-        </p:spPr>
-        <p:style>
-          <a:lnRef idx="2">
-            <a:schemeClr val="accent1">
-              <a:shade val="50000"/>
-            </a:schemeClr>
-          </a:lnRef>
-          <a:fillRef idx="1">
-            <a:schemeClr val="accent1"/>
-          </a:fillRef>
-          <a:effectRef idx="0">
-            <a:schemeClr val="accent1"/>
-          </a:effectRef>
-          <a:fontRef idx="minor">
-            <a:schemeClr val="lt1"/>
-          </a:fontRef>
-        </p:style>
-        <p:txBody>
-          <a:bodyPr rtlCol="0" anchor="ctr"/>
-          <a:lstStyle/>
-          <a:p>
-            <a:pPr algn="ctr"/>
-            <a:r>
-              <a:rPr lang="en-US" sz="1000" dirty="0"/>
-              <a:t>Beds &lt;= 45.9</a:t>
-            </a:r>
-          </a:p>
-        </p:txBody>
-      </p:sp>
-      <p:sp>
-        <p:nvSpPr>
-          <p:cNvPr id="13" name="Rounded Rectangle 12">
-            <a:extLst>
-              <a:ext uri="{FF2B5EF4-FFF2-40B4-BE49-F238E27FC236}">
-                <a16:creationId xmlns:a16="http://schemas.microsoft.com/office/drawing/2014/main" id="{920AF21E-6CE8-C2FB-25BF-7CF2C5F09228}"/>
-              </a:ext>
-            </a:extLst>
-          </p:cNvPr>
-          <p:cNvSpPr/>
-          <p:nvPr/>
-        </p:nvSpPr>
-        <p:spPr>
-          <a:xfrm>
-            <a:off x="2211733" y="1402911"/>
-            <a:ext cx="914400" cy="302781"/>
-          </a:xfrm>
-          <a:prstGeom prst="roundRect">
-            <a:avLst/>
-          </a:prstGeom>
-          <a:solidFill>
-            <a:schemeClr val="accent2">
-              <a:lumMod val="75000"/>
-            </a:schemeClr>
-          </a:solidFill>
-          <a:ln>
-            <a:solidFill>
-              <a:schemeClr val="accent2">
-                <a:lumMod val="40000"/>
-                <a:lumOff val="60000"/>
-              </a:schemeClr>
-            </a:solidFill>
-          </a:ln>
-        </p:spPr>
-        <p:style>
-          <a:lnRef idx="2">
-            <a:schemeClr val="accent1">
-              <a:shade val="50000"/>
-            </a:schemeClr>
-          </a:lnRef>
-          <a:fillRef idx="1">
-            <a:schemeClr val="accent1"/>
-          </a:fillRef>
-          <a:effectRef idx="0">
-            <a:schemeClr val="accent1"/>
-          </a:effectRef>
-          <a:fontRef idx="minor">
-            <a:schemeClr val="lt1"/>
-          </a:fontRef>
-        </p:style>
-        <p:txBody>
-          <a:bodyPr rtlCol="0" anchor="ctr"/>
-          <a:lstStyle/>
-          <a:p>
-            <a:pPr algn="ctr"/>
-            <a:r>
-              <a:rPr lang="en-US" sz="1000" dirty="0"/>
-              <a:t>Cases &lt;= 24.5</a:t>
-            </a:r>
-          </a:p>
-        </p:txBody>
-      </p:sp>
-      <p:sp>
-        <p:nvSpPr>
-          <p:cNvPr id="14" name="Rounded Rectangle 13">
-            <a:extLst>
-              <a:ext uri="{FF2B5EF4-FFF2-40B4-BE49-F238E27FC236}">
-                <a16:creationId xmlns:a16="http://schemas.microsoft.com/office/drawing/2014/main" id="{498F2907-72C4-EB94-F63B-EF93E1B453B3}"/>
-              </a:ext>
-            </a:extLst>
-          </p:cNvPr>
-          <p:cNvSpPr/>
-          <p:nvPr/>
-        </p:nvSpPr>
-        <p:spPr>
-          <a:xfrm>
-            <a:off x="611953" y="1458363"/>
-            <a:ext cx="914400" cy="302781"/>
-          </a:xfrm>
-          <a:prstGeom prst="roundRect">
-            <a:avLst/>
-          </a:prstGeom>
-          <a:solidFill>
-            <a:schemeClr val="accent2">
-              <a:lumMod val="75000"/>
-            </a:schemeClr>
-          </a:solidFill>
-          <a:ln>
-            <a:solidFill>
-              <a:schemeClr val="accent2">
-                <a:lumMod val="40000"/>
-                <a:lumOff val="60000"/>
-              </a:schemeClr>
-            </a:solidFill>
-          </a:ln>
-        </p:spPr>
-        <p:style>
-          <a:lnRef idx="2">
-            <a:schemeClr val="accent1">
-              <a:shade val="50000"/>
-            </a:schemeClr>
-          </a:lnRef>
-          <a:fillRef idx="1">
-            <a:schemeClr val="accent1"/>
-          </a:fillRef>
-          <a:effectRef idx="0">
-            <a:schemeClr val="accent1"/>
-          </a:effectRef>
-          <a:fontRef idx="minor">
-            <a:schemeClr val="lt1"/>
-          </a:fontRef>
-        </p:style>
-        <p:txBody>
-          <a:bodyPr rtlCol="0" anchor="ctr"/>
-          <a:lstStyle/>
-          <a:p>
-            <a:pPr algn="ctr"/>
-            <a:r>
-              <a:rPr lang="en-US" sz="1000" dirty="0"/>
-              <a:t>Admits &lt;= 1.6</a:t>
-            </a:r>
-          </a:p>
-        </p:txBody>
-      </p:sp>
-      <p:sp>
-        <p:nvSpPr>
-          <p:cNvPr id="15" name="Rounded Rectangle 14">
-            <a:extLst>
-              <a:ext uri="{FF2B5EF4-FFF2-40B4-BE49-F238E27FC236}">
-                <a16:creationId xmlns:a16="http://schemas.microsoft.com/office/drawing/2014/main" id="{5351D545-87C1-A8B9-7AD1-A9D08D72D897}"/>
-              </a:ext>
-            </a:extLst>
-          </p:cNvPr>
-          <p:cNvSpPr/>
-          <p:nvPr/>
-        </p:nvSpPr>
-        <p:spPr>
-          <a:xfrm>
-            <a:off x="483868" y="2016005"/>
-            <a:ext cx="527299" cy="302781"/>
-          </a:xfrm>
-          <a:prstGeom prst="roundRect">
-            <a:avLst/>
-          </a:prstGeom>
-          <a:solidFill>
-            <a:schemeClr val="accent2">
-              <a:lumMod val="75000"/>
-            </a:schemeClr>
-          </a:solidFill>
-          <a:ln>
-            <a:solidFill>
-              <a:schemeClr val="accent2">
-                <a:lumMod val="40000"/>
-                <a:lumOff val="60000"/>
-              </a:schemeClr>
-            </a:solidFill>
-          </a:ln>
-        </p:spPr>
-        <p:style>
-          <a:lnRef idx="2">
-            <a:schemeClr val="accent1">
-              <a:shade val="50000"/>
-            </a:schemeClr>
-          </a:lnRef>
-          <a:fillRef idx="1">
-            <a:schemeClr val="accent1"/>
-          </a:fillRef>
-          <a:effectRef idx="0">
-            <a:schemeClr val="accent1"/>
-          </a:effectRef>
-          <a:fontRef idx="minor">
-            <a:schemeClr val="lt1"/>
-          </a:fontRef>
-        </p:style>
-        <p:txBody>
-          <a:bodyPr rtlCol="0" anchor="ctr"/>
-          <a:lstStyle/>
-          <a:p>
-            <a:pPr algn="ctr"/>
-            <a:r>
-              <a:rPr lang="en-US" sz="1000" dirty="0"/>
-              <a:t>Yes</a:t>
-            </a:r>
-          </a:p>
-        </p:txBody>
-      </p:sp>
-      <p:sp>
-        <p:nvSpPr>
-          <p:cNvPr id="16" name="Rounded Rectangle 15">
-            <a:extLst>
-              <a:ext uri="{FF2B5EF4-FFF2-40B4-BE49-F238E27FC236}">
-                <a16:creationId xmlns:a16="http://schemas.microsoft.com/office/drawing/2014/main" id="{1D2C8D57-B828-2D15-1528-FBD9136DCFEF}"/>
-              </a:ext>
-            </a:extLst>
-          </p:cNvPr>
-          <p:cNvSpPr/>
-          <p:nvPr/>
-        </p:nvSpPr>
-        <p:spPr>
-          <a:xfrm>
-            <a:off x="1069153" y="2016005"/>
-            <a:ext cx="527299" cy="302780"/>
-          </a:xfrm>
-          <a:prstGeom prst="roundRect">
-            <a:avLst/>
-          </a:prstGeom>
-          <a:solidFill>
-            <a:schemeClr val="accent2">
-              <a:lumMod val="60000"/>
-              <a:lumOff val="40000"/>
-            </a:schemeClr>
-          </a:solidFill>
-          <a:ln>
-            <a:solidFill>
-              <a:schemeClr val="accent2">
-                <a:lumMod val="60000"/>
-                <a:lumOff val="40000"/>
-              </a:schemeClr>
-            </a:solidFill>
-          </a:ln>
-        </p:spPr>
-        <p:style>
-          <a:lnRef idx="2">
-            <a:schemeClr val="accent1">
-              <a:shade val="50000"/>
-            </a:schemeClr>
-          </a:lnRef>
-          <a:fillRef idx="1">
-            <a:schemeClr val="accent1"/>
-          </a:fillRef>
-          <a:effectRef idx="0">
-            <a:schemeClr val="accent1"/>
-          </a:effectRef>
-          <a:fontRef idx="minor">
-            <a:schemeClr val="lt1"/>
-          </a:fontRef>
-        </p:style>
-        <p:txBody>
-          <a:bodyPr rtlCol="0" anchor="ctr"/>
-          <a:lstStyle/>
-          <a:p>
-            <a:pPr algn="ctr"/>
-            <a:r>
-              <a:rPr lang="en-US" sz="1000" dirty="0"/>
-              <a:t>Yes</a:t>
-            </a:r>
-          </a:p>
-        </p:txBody>
-      </p:sp>
-      <p:sp>
-        <p:nvSpPr>
-          <p:cNvPr id="17" name="Rounded Rectangle 16">
-            <a:extLst>
-              <a:ext uri="{FF2B5EF4-FFF2-40B4-BE49-F238E27FC236}">
-                <a16:creationId xmlns:a16="http://schemas.microsoft.com/office/drawing/2014/main" id="{5B4948EF-26F9-71E1-5386-C60B2720C3C4}"/>
-              </a:ext>
-            </a:extLst>
-          </p:cNvPr>
-          <p:cNvSpPr/>
-          <p:nvPr/>
-        </p:nvSpPr>
-        <p:spPr>
-          <a:xfrm>
-            <a:off x="2150986" y="2742338"/>
-            <a:ext cx="914400" cy="302781"/>
-          </a:xfrm>
-          <a:prstGeom prst="roundRect">
-            <a:avLst/>
-          </a:prstGeom>
-          <a:solidFill>
-            <a:schemeClr val="accent2">
-              <a:lumMod val="75000"/>
-            </a:schemeClr>
-          </a:solidFill>
-          <a:ln>
-            <a:solidFill>
-              <a:schemeClr val="accent2">
-                <a:lumMod val="40000"/>
-                <a:lumOff val="60000"/>
-              </a:schemeClr>
-            </a:solidFill>
-          </a:ln>
-        </p:spPr>
-        <p:style>
-          <a:lnRef idx="2">
-            <a:schemeClr val="accent1">
-              <a:shade val="50000"/>
-            </a:schemeClr>
-          </a:lnRef>
-          <a:fillRef idx="1">
-            <a:schemeClr val="accent1"/>
-          </a:fillRef>
-          <a:effectRef idx="0">
-            <a:schemeClr val="accent1"/>
-          </a:effectRef>
-          <a:fontRef idx="minor">
-            <a:schemeClr val="lt1"/>
-          </a:fontRef>
-        </p:style>
-        <p:txBody>
-          <a:bodyPr rtlCol="0" anchor="ctr"/>
-          <a:lstStyle/>
-          <a:p>
-            <a:pPr algn="ctr"/>
-            <a:r>
-              <a:rPr lang="en-US" sz="1000" dirty="0"/>
-              <a:t>Cases &lt;= 105.5</a:t>
-            </a:r>
-          </a:p>
-        </p:txBody>
-      </p:sp>
-      <p:sp>
-        <p:nvSpPr>
-          <p:cNvPr id="18" name="Rounded Rectangle 17">
-            <a:extLst>
-              <a:ext uri="{FF2B5EF4-FFF2-40B4-BE49-F238E27FC236}">
-                <a16:creationId xmlns:a16="http://schemas.microsoft.com/office/drawing/2014/main" id="{D241BC8E-D846-4EE9-0BC9-CDD6A4CE2CB5}"/>
-              </a:ext>
-            </a:extLst>
-          </p:cNvPr>
-          <p:cNvSpPr/>
-          <p:nvPr/>
-        </p:nvSpPr>
-        <p:spPr>
-          <a:xfrm>
-            <a:off x="2713907" y="1954354"/>
-            <a:ext cx="914400" cy="302781"/>
-          </a:xfrm>
-          <a:prstGeom prst="roundRect">
-            <a:avLst/>
-          </a:prstGeom>
-          <a:solidFill>
-            <a:schemeClr val="accent2">
-              <a:lumMod val="60000"/>
-              <a:lumOff val="40000"/>
-            </a:schemeClr>
-          </a:solidFill>
-          <a:ln>
-            <a:solidFill>
-              <a:schemeClr val="accent2">
-                <a:lumMod val="60000"/>
-                <a:lumOff val="40000"/>
-              </a:schemeClr>
-            </a:solidFill>
-          </a:ln>
-        </p:spPr>
-        <p:style>
-          <a:lnRef idx="2">
-            <a:schemeClr val="accent1">
-              <a:shade val="50000"/>
-            </a:schemeClr>
-          </a:lnRef>
-          <a:fillRef idx="1">
-            <a:schemeClr val="accent1"/>
-          </a:fillRef>
-          <a:effectRef idx="0">
-            <a:schemeClr val="accent1"/>
-          </a:effectRef>
-          <a:fontRef idx="minor">
-            <a:schemeClr val="lt1"/>
-          </a:fontRef>
-        </p:style>
-        <p:txBody>
-          <a:bodyPr rtlCol="0" anchor="ctr"/>
-          <a:lstStyle/>
-          <a:p>
-            <a:pPr algn="ctr"/>
-            <a:r>
-              <a:rPr lang="en-US" sz="1000" dirty="0"/>
-              <a:t>Beds &lt;= 16.7</a:t>
-            </a:r>
-          </a:p>
-        </p:txBody>
-      </p:sp>
-      <p:sp>
-        <p:nvSpPr>
-          <p:cNvPr id="19" name="Rounded Rectangle 18">
-            <a:extLst>
-              <a:ext uri="{FF2B5EF4-FFF2-40B4-BE49-F238E27FC236}">
-                <a16:creationId xmlns:a16="http://schemas.microsoft.com/office/drawing/2014/main" id="{90465BFA-DE21-3B77-F4DD-05E6DB6DA287}"/>
-              </a:ext>
-            </a:extLst>
-          </p:cNvPr>
-          <p:cNvSpPr/>
-          <p:nvPr/>
-        </p:nvSpPr>
-        <p:spPr>
-          <a:xfrm>
-            <a:off x="1887337" y="1979271"/>
-            <a:ext cx="527299" cy="302781"/>
-          </a:xfrm>
-          <a:prstGeom prst="roundRect">
-            <a:avLst/>
-          </a:prstGeom>
-          <a:solidFill>
-            <a:schemeClr val="accent2">
-              <a:lumMod val="75000"/>
-            </a:schemeClr>
-          </a:solidFill>
-          <a:ln>
-            <a:solidFill>
-              <a:schemeClr val="accent2">
-                <a:lumMod val="40000"/>
-                <a:lumOff val="60000"/>
-              </a:schemeClr>
-            </a:solidFill>
-          </a:ln>
-        </p:spPr>
-        <p:style>
-          <a:lnRef idx="2">
-            <a:schemeClr val="accent1">
-              <a:shade val="50000"/>
-            </a:schemeClr>
-          </a:lnRef>
-          <a:fillRef idx="1">
-            <a:schemeClr val="accent1"/>
-          </a:fillRef>
-          <a:effectRef idx="0">
-            <a:schemeClr val="accent1"/>
-          </a:effectRef>
-          <a:fontRef idx="minor">
-            <a:schemeClr val="lt1"/>
-          </a:fontRef>
-        </p:style>
-        <p:txBody>
-          <a:bodyPr rtlCol="0" anchor="ctr"/>
-          <a:lstStyle/>
-          <a:p>
-            <a:pPr algn="ctr"/>
-            <a:r>
-              <a:rPr lang="en-US" sz="1000" dirty="0"/>
-              <a:t>Yes</a:t>
-            </a:r>
-          </a:p>
-        </p:txBody>
-      </p:sp>
-      <p:sp>
-        <p:nvSpPr>
-          <p:cNvPr id="20" name="Rounded Rectangle 19">
-            <a:extLst>
-              <a:ext uri="{FF2B5EF4-FFF2-40B4-BE49-F238E27FC236}">
-                <a16:creationId xmlns:a16="http://schemas.microsoft.com/office/drawing/2014/main" id="{DFBCE5B1-C393-050F-3410-592DD36935A3}"/>
-              </a:ext>
-            </a:extLst>
-          </p:cNvPr>
-          <p:cNvSpPr/>
-          <p:nvPr/>
-        </p:nvSpPr>
-        <p:spPr>
-          <a:xfrm>
-            <a:off x="3376190" y="2742337"/>
-            <a:ext cx="914400" cy="302781"/>
-          </a:xfrm>
-          <a:prstGeom prst="roundRect">
-            <a:avLst/>
-          </a:prstGeom>
-          <a:solidFill>
-            <a:schemeClr val="accent2">
-              <a:lumMod val="40000"/>
-              <a:lumOff val="60000"/>
-            </a:schemeClr>
-          </a:solidFill>
-          <a:ln>
-            <a:solidFill>
-              <a:schemeClr val="accent2">
-                <a:lumMod val="40000"/>
-                <a:lumOff val="60000"/>
-              </a:schemeClr>
-            </a:solidFill>
-          </a:ln>
-        </p:spPr>
-        <p:style>
-          <a:lnRef idx="2">
-            <a:schemeClr val="accent1">
-              <a:shade val="50000"/>
-            </a:schemeClr>
-          </a:lnRef>
-          <a:fillRef idx="1">
-            <a:schemeClr val="accent1"/>
-          </a:fillRef>
-          <a:effectRef idx="0">
-            <a:schemeClr val="accent1"/>
-          </a:effectRef>
-          <a:fontRef idx="minor">
-            <a:schemeClr val="lt1"/>
-          </a:fontRef>
-        </p:style>
-        <p:txBody>
-          <a:bodyPr rtlCol="0" anchor="ctr"/>
-          <a:lstStyle/>
-          <a:p>
-            <a:pPr algn="ctr"/>
-            <a:r>
-              <a:rPr lang="en-US" sz="1000" dirty="0"/>
-              <a:t>ICU &lt;= 0.1</a:t>
-            </a:r>
-          </a:p>
-        </p:txBody>
-      </p:sp>
-      <p:sp>
-        <p:nvSpPr>
-          <p:cNvPr id="21" name="Rounded Rectangle 20">
-            <a:extLst>
-              <a:ext uri="{FF2B5EF4-FFF2-40B4-BE49-F238E27FC236}">
-                <a16:creationId xmlns:a16="http://schemas.microsoft.com/office/drawing/2014/main" id="{99F361A8-DFDA-3B86-640A-CDDE801B2DC6}"/>
-              </a:ext>
-            </a:extLst>
-          </p:cNvPr>
-          <p:cNvSpPr/>
-          <p:nvPr/>
-        </p:nvSpPr>
-        <p:spPr>
-          <a:xfrm>
-            <a:off x="1967575" y="3318698"/>
-            <a:ext cx="527299" cy="302781"/>
-          </a:xfrm>
-          <a:prstGeom prst="roundRect">
-            <a:avLst/>
-          </a:prstGeom>
-          <a:solidFill>
-            <a:schemeClr val="accent2">
-              <a:lumMod val="75000"/>
-            </a:schemeClr>
-          </a:solidFill>
-          <a:ln>
-            <a:solidFill>
-              <a:schemeClr val="accent2">
-                <a:lumMod val="40000"/>
-                <a:lumOff val="60000"/>
-              </a:schemeClr>
-            </a:solidFill>
-          </a:ln>
-        </p:spPr>
-        <p:style>
-          <a:lnRef idx="2">
-            <a:schemeClr val="accent1">
-              <a:shade val="50000"/>
-            </a:schemeClr>
-          </a:lnRef>
-          <a:fillRef idx="1">
-            <a:schemeClr val="accent1"/>
-          </a:fillRef>
-          <a:effectRef idx="0">
-            <a:schemeClr val="accent1"/>
-          </a:effectRef>
-          <a:fontRef idx="minor">
-            <a:schemeClr val="lt1"/>
-          </a:fontRef>
-        </p:style>
-        <p:txBody>
-          <a:bodyPr rtlCol="0" anchor="ctr"/>
-          <a:lstStyle/>
-          <a:p>
-            <a:pPr algn="ctr"/>
-            <a:r>
-              <a:rPr lang="en-US" sz="1000" dirty="0"/>
-              <a:t>Yes</a:t>
-            </a:r>
-          </a:p>
-        </p:txBody>
-      </p:sp>
-      <p:sp>
-        <p:nvSpPr>
-          <p:cNvPr id="22" name="Rounded Rectangle 21">
-            <a:extLst>
-              <a:ext uri="{FF2B5EF4-FFF2-40B4-BE49-F238E27FC236}">
-                <a16:creationId xmlns:a16="http://schemas.microsoft.com/office/drawing/2014/main" id="{BD32523F-8D77-3B4D-D33A-A6125E1F9EFC}"/>
-              </a:ext>
-            </a:extLst>
-          </p:cNvPr>
-          <p:cNvSpPr/>
-          <p:nvPr/>
-        </p:nvSpPr>
-        <p:spPr>
-          <a:xfrm>
-            <a:off x="2631355" y="3318699"/>
-            <a:ext cx="527299" cy="302780"/>
-          </a:xfrm>
-          <a:prstGeom prst="roundRect">
-            <a:avLst/>
-          </a:prstGeom>
-          <a:solidFill>
-            <a:schemeClr val="accent2">
-              <a:lumMod val="60000"/>
-              <a:lumOff val="40000"/>
-            </a:schemeClr>
-          </a:solidFill>
-          <a:ln>
-            <a:solidFill>
-              <a:schemeClr val="accent2">
-                <a:lumMod val="60000"/>
-                <a:lumOff val="40000"/>
-              </a:schemeClr>
-            </a:solidFill>
-          </a:ln>
-        </p:spPr>
-        <p:style>
-          <a:lnRef idx="2">
-            <a:schemeClr val="accent1">
-              <a:shade val="50000"/>
-            </a:schemeClr>
-          </a:lnRef>
-          <a:fillRef idx="1">
-            <a:schemeClr val="accent1"/>
-          </a:fillRef>
-          <a:effectRef idx="0">
-            <a:schemeClr val="accent1"/>
-          </a:effectRef>
-          <a:fontRef idx="minor">
-            <a:schemeClr val="lt1"/>
-          </a:fontRef>
-        </p:style>
-        <p:txBody>
-          <a:bodyPr rtlCol="0" anchor="ctr"/>
-          <a:lstStyle/>
-          <a:p>
-            <a:pPr algn="ctr"/>
-            <a:r>
-              <a:rPr lang="en-US" sz="1000" dirty="0"/>
-              <a:t>Yes/No</a:t>
-            </a:r>
-          </a:p>
-        </p:txBody>
-      </p:sp>
-      <p:sp>
-        <p:nvSpPr>
-          <p:cNvPr id="23" name="Rounded Rectangle 22">
-            <a:extLst>
-              <a:ext uri="{FF2B5EF4-FFF2-40B4-BE49-F238E27FC236}">
-                <a16:creationId xmlns:a16="http://schemas.microsoft.com/office/drawing/2014/main" id="{3E87CF6B-E84A-BE04-9EFE-E48024F711D3}"/>
-              </a:ext>
-            </a:extLst>
-          </p:cNvPr>
-          <p:cNvSpPr/>
-          <p:nvPr/>
-        </p:nvSpPr>
-        <p:spPr>
-          <a:xfrm>
-            <a:off x="3306091" y="3318552"/>
-            <a:ext cx="527299" cy="302781"/>
-          </a:xfrm>
-          <a:prstGeom prst="roundRect">
-            <a:avLst/>
-          </a:prstGeom>
-          <a:solidFill>
-            <a:schemeClr val="accent2">
-              <a:lumMod val="75000"/>
-            </a:schemeClr>
-          </a:solidFill>
-          <a:ln>
-            <a:solidFill>
-              <a:schemeClr val="accent2">
-                <a:lumMod val="40000"/>
-                <a:lumOff val="60000"/>
-              </a:schemeClr>
-            </a:solidFill>
-          </a:ln>
-        </p:spPr>
-        <p:style>
-          <a:lnRef idx="2">
-            <a:schemeClr val="accent1">
-              <a:shade val="50000"/>
-            </a:schemeClr>
-          </a:lnRef>
-          <a:fillRef idx="1">
-            <a:schemeClr val="accent1"/>
-          </a:fillRef>
-          <a:effectRef idx="0">
-            <a:schemeClr val="accent1"/>
-          </a:effectRef>
-          <a:fontRef idx="minor">
-            <a:schemeClr val="lt1"/>
-          </a:fontRef>
-        </p:style>
-        <p:txBody>
-          <a:bodyPr rtlCol="0" anchor="ctr"/>
-          <a:lstStyle/>
-          <a:p>
-            <a:pPr algn="ctr"/>
-            <a:r>
-              <a:rPr lang="en-US" sz="1000" dirty="0"/>
-              <a:t>Yes</a:t>
-            </a:r>
-          </a:p>
-        </p:txBody>
-      </p:sp>
-      <p:sp>
-        <p:nvSpPr>
-          <p:cNvPr id="24" name="Rounded Rectangle 23">
-            <a:extLst>
-              <a:ext uri="{FF2B5EF4-FFF2-40B4-BE49-F238E27FC236}">
-                <a16:creationId xmlns:a16="http://schemas.microsoft.com/office/drawing/2014/main" id="{40094A41-852C-3F3B-B8B1-D430EFB587D3}"/>
-              </a:ext>
-            </a:extLst>
-          </p:cNvPr>
-          <p:cNvSpPr/>
-          <p:nvPr/>
-        </p:nvSpPr>
-        <p:spPr>
-          <a:xfrm>
-            <a:off x="3993116" y="3312266"/>
-            <a:ext cx="527299" cy="302780"/>
-          </a:xfrm>
-          <a:prstGeom prst="roundRect">
-            <a:avLst/>
-          </a:prstGeom>
-          <a:solidFill>
-            <a:schemeClr val="accent1">
-              <a:lumMod val="60000"/>
-              <a:lumOff val="40000"/>
-            </a:schemeClr>
-          </a:solidFill>
-          <a:ln>
-            <a:solidFill>
-              <a:schemeClr val="accent1">
-                <a:lumMod val="60000"/>
-                <a:lumOff val="40000"/>
-              </a:schemeClr>
-            </a:solidFill>
-          </a:ln>
-        </p:spPr>
-        <p:style>
-          <a:lnRef idx="2">
-            <a:schemeClr val="accent1">
-              <a:shade val="50000"/>
-            </a:schemeClr>
-          </a:lnRef>
-          <a:fillRef idx="1">
-            <a:schemeClr val="accent1"/>
-          </a:fillRef>
-          <a:effectRef idx="0">
-            <a:schemeClr val="accent1"/>
-          </a:effectRef>
-          <a:fontRef idx="minor">
-            <a:schemeClr val="lt1"/>
-          </a:fontRef>
-        </p:style>
-        <p:txBody>
-          <a:bodyPr rtlCol="0" anchor="ctr"/>
-          <a:lstStyle/>
-          <a:p>
-            <a:pPr algn="ctr"/>
-            <a:r>
-              <a:rPr lang="en-US" sz="1000" dirty="0"/>
-              <a:t>Yes/No</a:t>
-            </a:r>
-          </a:p>
-        </p:txBody>
-      </p:sp>
-      <p:sp>
-        <p:nvSpPr>
-          <p:cNvPr id="27" name="Rounded Rectangle 26">
-            <a:extLst>
-              <a:ext uri="{FF2B5EF4-FFF2-40B4-BE49-F238E27FC236}">
-                <a16:creationId xmlns:a16="http://schemas.microsoft.com/office/drawing/2014/main" id="{F4962516-D081-C0FB-6D48-8E450603EF1D}"/>
-              </a:ext>
-            </a:extLst>
-          </p:cNvPr>
-          <p:cNvSpPr/>
-          <p:nvPr/>
-        </p:nvSpPr>
-        <p:spPr>
-          <a:xfrm>
-            <a:off x="5638800" y="1892732"/>
-            <a:ext cx="914400" cy="302781"/>
-          </a:xfrm>
-          <a:prstGeom prst="roundRect">
-            <a:avLst/>
-          </a:prstGeom>
-          <a:solidFill>
-            <a:schemeClr val="accent1">
-              <a:lumMod val="60000"/>
-              <a:lumOff val="40000"/>
-            </a:schemeClr>
-          </a:solidFill>
-          <a:ln>
-            <a:solidFill>
-              <a:schemeClr val="accent1">
-                <a:lumMod val="60000"/>
-                <a:lumOff val="40000"/>
-              </a:schemeClr>
-            </a:solidFill>
-          </a:ln>
-        </p:spPr>
-        <p:style>
-          <a:lnRef idx="2">
-            <a:schemeClr val="accent1">
-              <a:shade val="50000"/>
-            </a:schemeClr>
-          </a:lnRef>
-          <a:fillRef idx="1">
-            <a:schemeClr val="accent1"/>
-          </a:fillRef>
-          <a:effectRef idx="0">
-            <a:schemeClr val="accent1"/>
-          </a:effectRef>
-          <a:fontRef idx="minor">
-            <a:schemeClr val="lt1"/>
-          </a:fontRef>
-        </p:style>
-        <p:txBody>
-          <a:bodyPr rtlCol="0" anchor="ctr"/>
-          <a:lstStyle/>
-          <a:p>
-            <a:pPr algn="ctr"/>
-            <a:r>
-              <a:rPr lang="en-US" sz="1000" dirty="0"/>
-              <a:t>Deaths &lt;= 2.04</a:t>
-            </a:r>
-          </a:p>
-        </p:txBody>
-      </p:sp>
-      <p:sp>
-        <p:nvSpPr>
-          <p:cNvPr id="28" name="Rounded Rectangle 27">
-            <a:extLst>
-              <a:ext uri="{FF2B5EF4-FFF2-40B4-BE49-F238E27FC236}">
-                <a16:creationId xmlns:a16="http://schemas.microsoft.com/office/drawing/2014/main" id="{02F95127-4FB0-EA83-3A48-D62619DDB20F}"/>
-              </a:ext>
-            </a:extLst>
-          </p:cNvPr>
-          <p:cNvSpPr/>
-          <p:nvPr/>
-        </p:nvSpPr>
-        <p:spPr>
-          <a:xfrm>
-            <a:off x="4217552" y="2377935"/>
-            <a:ext cx="527299" cy="302780"/>
-          </a:xfrm>
-          <a:prstGeom prst="roundRect">
-            <a:avLst/>
-          </a:prstGeom>
-          <a:solidFill>
-            <a:schemeClr val="accent1">
-              <a:lumMod val="75000"/>
-            </a:schemeClr>
-          </a:solidFill>
-          <a:ln>
-            <a:solidFill>
-              <a:schemeClr val="accent1">
-                <a:lumMod val="75000"/>
-              </a:schemeClr>
-            </a:solidFill>
-          </a:ln>
-        </p:spPr>
-        <p:style>
-          <a:lnRef idx="2">
-            <a:schemeClr val="accent1">
-              <a:shade val="50000"/>
-            </a:schemeClr>
-          </a:lnRef>
-          <a:fillRef idx="1">
-            <a:schemeClr val="accent1"/>
-          </a:fillRef>
-          <a:effectRef idx="0">
-            <a:schemeClr val="accent1"/>
-          </a:effectRef>
-          <a:fontRef idx="minor">
-            <a:schemeClr val="lt1"/>
-          </a:fontRef>
-        </p:style>
-        <p:txBody>
-          <a:bodyPr rtlCol="0" anchor="ctr"/>
-          <a:lstStyle/>
-          <a:p>
-            <a:pPr algn="ctr"/>
-            <a:r>
-              <a:rPr lang="en-US" sz="1000" dirty="0"/>
-              <a:t>No</a:t>
-            </a:r>
-          </a:p>
-        </p:txBody>
-      </p:sp>
-      <p:sp>
-        <p:nvSpPr>
-          <p:cNvPr id="29" name="Rounded Rectangle 28">
-            <a:extLst>
-              <a:ext uri="{FF2B5EF4-FFF2-40B4-BE49-F238E27FC236}">
-                <a16:creationId xmlns:a16="http://schemas.microsoft.com/office/drawing/2014/main" id="{250F66CE-88F8-A768-8740-00F6D1CF2DB0}"/>
-              </a:ext>
-            </a:extLst>
-          </p:cNvPr>
-          <p:cNvSpPr/>
-          <p:nvPr/>
-        </p:nvSpPr>
-        <p:spPr>
-          <a:xfrm>
-            <a:off x="4841979" y="2377935"/>
-            <a:ext cx="527299" cy="302780"/>
-          </a:xfrm>
-          <a:prstGeom prst="roundRect">
-            <a:avLst/>
-          </a:prstGeom>
-          <a:solidFill>
-            <a:schemeClr val="accent1">
-              <a:lumMod val="60000"/>
-              <a:lumOff val="40000"/>
-            </a:schemeClr>
-          </a:solidFill>
-          <a:ln>
-            <a:solidFill>
-              <a:schemeClr val="accent1">
-                <a:lumMod val="60000"/>
-                <a:lumOff val="40000"/>
-              </a:schemeClr>
-            </a:solidFill>
-          </a:ln>
-        </p:spPr>
-        <p:style>
-          <a:lnRef idx="2">
-            <a:schemeClr val="accent1">
-              <a:shade val="50000"/>
-            </a:schemeClr>
-          </a:lnRef>
-          <a:fillRef idx="1">
-            <a:schemeClr val="accent1"/>
-          </a:fillRef>
-          <a:effectRef idx="0">
-            <a:schemeClr val="accent1"/>
-          </a:effectRef>
-          <a:fontRef idx="minor">
-            <a:schemeClr val="lt1"/>
-          </a:fontRef>
-        </p:style>
-        <p:txBody>
-          <a:bodyPr rtlCol="0" anchor="ctr"/>
-          <a:lstStyle/>
-          <a:p>
-            <a:pPr algn="ctr"/>
-            <a:r>
-              <a:rPr lang="en-US" sz="1000" dirty="0"/>
-              <a:t>No</a:t>
-            </a:r>
-          </a:p>
-        </p:txBody>
-      </p:sp>
-      <p:sp>
-        <p:nvSpPr>
-          <p:cNvPr id="30" name="Rounded Rectangle 29">
-            <a:extLst>
-              <a:ext uri="{FF2B5EF4-FFF2-40B4-BE49-F238E27FC236}">
-                <a16:creationId xmlns:a16="http://schemas.microsoft.com/office/drawing/2014/main" id="{BED8297C-D348-42E2-32E8-573E945AD537}"/>
-              </a:ext>
-            </a:extLst>
-          </p:cNvPr>
-          <p:cNvSpPr/>
-          <p:nvPr/>
-        </p:nvSpPr>
-        <p:spPr>
-          <a:xfrm>
-            <a:off x="5614577" y="2327463"/>
-            <a:ext cx="527299" cy="302780"/>
-          </a:xfrm>
-          <a:prstGeom prst="roundRect">
-            <a:avLst/>
-          </a:prstGeom>
-          <a:solidFill>
-            <a:schemeClr val="accent1">
-              <a:lumMod val="75000"/>
-            </a:schemeClr>
-          </a:solidFill>
-          <a:ln>
-            <a:solidFill>
-              <a:schemeClr val="accent1">
-                <a:lumMod val="75000"/>
-              </a:schemeClr>
-            </a:solidFill>
-          </a:ln>
-        </p:spPr>
-        <p:style>
-          <a:lnRef idx="2">
-            <a:schemeClr val="accent1">
-              <a:shade val="50000"/>
-            </a:schemeClr>
-          </a:lnRef>
-          <a:fillRef idx="1">
-            <a:schemeClr val="accent1"/>
-          </a:fillRef>
-          <a:effectRef idx="0">
-            <a:schemeClr val="accent1"/>
-          </a:effectRef>
-          <a:fontRef idx="minor">
-            <a:schemeClr val="lt1"/>
-          </a:fontRef>
-        </p:style>
-        <p:txBody>
-          <a:bodyPr rtlCol="0" anchor="ctr"/>
-          <a:lstStyle/>
-          <a:p>
-            <a:pPr algn="ctr"/>
-            <a:r>
-              <a:rPr lang="en-US" sz="1000" dirty="0"/>
-              <a:t>No</a:t>
-            </a:r>
-          </a:p>
-        </p:txBody>
-      </p:sp>
-      <p:sp>
-        <p:nvSpPr>
-          <p:cNvPr id="31" name="Rounded Rectangle 30">
-            <a:extLst>
-              <a:ext uri="{FF2B5EF4-FFF2-40B4-BE49-F238E27FC236}">
-                <a16:creationId xmlns:a16="http://schemas.microsoft.com/office/drawing/2014/main" id="{6DB9EF5E-4CB9-2321-E399-B2A5FC952B4B}"/>
-              </a:ext>
-            </a:extLst>
-          </p:cNvPr>
-          <p:cNvSpPr/>
-          <p:nvPr/>
-        </p:nvSpPr>
-        <p:spPr>
-          <a:xfrm>
-            <a:off x="6327752" y="2312272"/>
-            <a:ext cx="914400" cy="302781"/>
-          </a:xfrm>
-          <a:prstGeom prst="roundRect">
-            <a:avLst/>
-          </a:prstGeom>
-          <a:solidFill>
-            <a:schemeClr val="accent1">
-              <a:lumMod val="60000"/>
-              <a:lumOff val="40000"/>
-            </a:schemeClr>
-          </a:solidFill>
-          <a:ln>
-            <a:solidFill>
-              <a:schemeClr val="accent1">
-                <a:lumMod val="60000"/>
-                <a:lumOff val="40000"/>
-              </a:schemeClr>
-            </a:solidFill>
-          </a:ln>
-        </p:spPr>
-        <p:style>
-          <a:lnRef idx="2">
-            <a:schemeClr val="accent1">
-              <a:shade val="50000"/>
-            </a:schemeClr>
-          </a:lnRef>
-          <a:fillRef idx="1">
-            <a:schemeClr val="accent1"/>
-          </a:fillRef>
-          <a:effectRef idx="0">
-            <a:schemeClr val="accent1"/>
-          </a:effectRef>
-          <a:fontRef idx="minor">
-            <a:schemeClr val="lt1"/>
-          </a:fontRef>
-        </p:style>
-        <p:txBody>
-          <a:bodyPr rtlCol="0" anchor="ctr"/>
-          <a:lstStyle/>
-          <a:p>
-            <a:pPr algn="ctr"/>
-            <a:r>
-              <a:rPr lang="en-US" sz="1000" dirty="0"/>
-              <a:t>ICU &lt;= 1.4</a:t>
-            </a:r>
-          </a:p>
-        </p:txBody>
-      </p:sp>
-      <p:sp>
-        <p:nvSpPr>
-          <p:cNvPr id="32" name="Rounded Rectangle 31">
-            <a:extLst>
-              <a:ext uri="{FF2B5EF4-FFF2-40B4-BE49-F238E27FC236}">
-                <a16:creationId xmlns:a16="http://schemas.microsoft.com/office/drawing/2014/main" id="{19A8DD14-9F0F-75FE-40D3-686028832DB5}"/>
-              </a:ext>
-            </a:extLst>
-          </p:cNvPr>
-          <p:cNvSpPr/>
-          <p:nvPr/>
-        </p:nvSpPr>
-        <p:spPr>
-          <a:xfrm>
-            <a:off x="6217001" y="3009486"/>
-            <a:ext cx="527299" cy="302780"/>
-          </a:xfrm>
-          <a:prstGeom prst="roundRect">
-            <a:avLst/>
-          </a:prstGeom>
-          <a:solidFill>
-            <a:schemeClr val="accent1">
-              <a:lumMod val="75000"/>
-            </a:schemeClr>
-          </a:solidFill>
-          <a:ln>
-            <a:solidFill>
-              <a:schemeClr val="accent1">
-                <a:lumMod val="75000"/>
-              </a:schemeClr>
-            </a:solidFill>
-          </a:ln>
-        </p:spPr>
-        <p:style>
-          <a:lnRef idx="2">
-            <a:schemeClr val="accent1">
-              <a:shade val="50000"/>
-            </a:schemeClr>
-          </a:lnRef>
-          <a:fillRef idx="1">
-            <a:schemeClr val="accent1"/>
-          </a:fillRef>
-          <a:effectRef idx="0">
-            <a:schemeClr val="accent1"/>
-          </a:effectRef>
-          <a:fontRef idx="minor">
-            <a:schemeClr val="lt1"/>
-          </a:fontRef>
-        </p:style>
-        <p:txBody>
-          <a:bodyPr rtlCol="0" anchor="ctr"/>
-          <a:lstStyle/>
-          <a:p>
-            <a:pPr algn="ctr"/>
-            <a:r>
-              <a:rPr lang="en-US" sz="1000" dirty="0"/>
-              <a:t>No</a:t>
-            </a:r>
-          </a:p>
-        </p:txBody>
-      </p:sp>
-      <p:sp>
-        <p:nvSpPr>
-          <p:cNvPr id="33" name="Rounded Rectangle 32">
-            <a:extLst>
-              <a:ext uri="{FF2B5EF4-FFF2-40B4-BE49-F238E27FC236}">
-                <a16:creationId xmlns:a16="http://schemas.microsoft.com/office/drawing/2014/main" id="{1CDCCCA6-4801-89FE-7042-9AA69CF942DD}"/>
-              </a:ext>
-            </a:extLst>
-          </p:cNvPr>
-          <p:cNvSpPr/>
-          <p:nvPr/>
-        </p:nvSpPr>
-        <p:spPr>
-          <a:xfrm>
-            <a:off x="6841428" y="3009486"/>
-            <a:ext cx="527299" cy="302780"/>
-          </a:xfrm>
-          <a:prstGeom prst="roundRect">
-            <a:avLst/>
-          </a:prstGeom>
-          <a:solidFill>
-            <a:schemeClr val="accent1">
-              <a:lumMod val="60000"/>
-              <a:lumOff val="40000"/>
-            </a:schemeClr>
-          </a:solidFill>
-          <a:ln>
-            <a:solidFill>
-              <a:schemeClr val="accent1">
-                <a:lumMod val="60000"/>
-                <a:lumOff val="40000"/>
-              </a:schemeClr>
-            </a:solidFill>
-          </a:ln>
-        </p:spPr>
-        <p:style>
-          <a:lnRef idx="2">
-            <a:schemeClr val="accent1">
-              <a:shade val="50000"/>
-            </a:schemeClr>
-          </a:lnRef>
-          <a:fillRef idx="1">
-            <a:schemeClr val="accent1"/>
-          </a:fillRef>
-          <a:effectRef idx="0">
-            <a:schemeClr val="accent1"/>
-          </a:effectRef>
-          <a:fontRef idx="minor">
-            <a:schemeClr val="lt1"/>
-          </a:fontRef>
-        </p:style>
-        <p:txBody>
-          <a:bodyPr rtlCol="0" anchor="ctr"/>
-          <a:lstStyle/>
-          <a:p>
-            <a:pPr algn="ctr"/>
-            <a:r>
-              <a:rPr lang="en-US" sz="1000" dirty="0"/>
-              <a:t>No</a:t>
-            </a:r>
-          </a:p>
-        </p:txBody>
-      </p:sp>
-      <p:sp>
-        <p:nvSpPr>
-          <p:cNvPr id="34" name="Rounded Rectangle 33">
-            <a:extLst>
-              <a:ext uri="{FF2B5EF4-FFF2-40B4-BE49-F238E27FC236}">
-                <a16:creationId xmlns:a16="http://schemas.microsoft.com/office/drawing/2014/main" id="{CF16C393-4858-2106-79E9-04C5B3C0AB96}"/>
-              </a:ext>
-            </a:extLst>
-          </p:cNvPr>
-          <p:cNvSpPr/>
-          <p:nvPr/>
-        </p:nvSpPr>
-        <p:spPr>
-          <a:xfrm>
-            <a:off x="7475028" y="1864614"/>
-            <a:ext cx="914400" cy="302781"/>
-          </a:xfrm>
-          <a:prstGeom prst="roundRect">
-            <a:avLst/>
-          </a:prstGeom>
-          <a:solidFill>
-            <a:schemeClr val="accent1">
-              <a:lumMod val="60000"/>
-              <a:lumOff val="40000"/>
-            </a:schemeClr>
-          </a:solidFill>
-          <a:ln>
-            <a:solidFill>
-              <a:schemeClr val="accent1">
-                <a:lumMod val="60000"/>
-                <a:lumOff val="40000"/>
-              </a:schemeClr>
-            </a:solidFill>
-          </a:ln>
-        </p:spPr>
-        <p:style>
-          <a:lnRef idx="2">
-            <a:schemeClr val="accent1">
-              <a:shade val="50000"/>
-            </a:schemeClr>
-          </a:lnRef>
-          <a:fillRef idx="1">
-            <a:schemeClr val="accent1"/>
-          </a:fillRef>
-          <a:effectRef idx="0">
-            <a:schemeClr val="accent1"/>
-          </a:effectRef>
-          <a:fontRef idx="minor">
-            <a:schemeClr val="lt1"/>
-          </a:fontRef>
-        </p:style>
-        <p:txBody>
-          <a:bodyPr rtlCol="0" anchor="ctr"/>
-          <a:lstStyle/>
-          <a:p>
-            <a:pPr algn="ctr"/>
-            <a:r>
-              <a:rPr lang="en-US" sz="1000" dirty="0"/>
-              <a:t>Change in admits &lt;= 7.6</a:t>
-            </a:r>
-          </a:p>
-        </p:txBody>
-      </p:sp>
-      <p:sp>
-        <p:nvSpPr>
-          <p:cNvPr id="35" name="Rounded Rectangle 34">
-            <a:extLst>
-              <a:ext uri="{FF2B5EF4-FFF2-40B4-BE49-F238E27FC236}">
-                <a16:creationId xmlns:a16="http://schemas.microsoft.com/office/drawing/2014/main" id="{52A4B6D8-A785-5790-5556-1BB1B0D225DC}"/>
-              </a:ext>
-            </a:extLst>
-          </p:cNvPr>
-          <p:cNvSpPr/>
-          <p:nvPr/>
-        </p:nvSpPr>
-        <p:spPr>
-          <a:xfrm>
-            <a:off x="8571355" y="1864614"/>
-            <a:ext cx="527299" cy="302780"/>
-          </a:xfrm>
-          <a:prstGeom prst="roundRect">
-            <a:avLst/>
-          </a:prstGeom>
-          <a:solidFill>
-            <a:schemeClr val="accent1">
-              <a:lumMod val="60000"/>
-              <a:lumOff val="40000"/>
-            </a:schemeClr>
-          </a:solidFill>
-          <a:ln>
-            <a:solidFill>
-              <a:schemeClr val="accent1">
-                <a:lumMod val="60000"/>
-                <a:lumOff val="40000"/>
-              </a:schemeClr>
-            </a:solidFill>
-          </a:ln>
-        </p:spPr>
-        <p:style>
-          <a:lnRef idx="2">
-            <a:schemeClr val="accent1">
-              <a:shade val="50000"/>
-            </a:schemeClr>
-          </a:lnRef>
-          <a:fillRef idx="1">
-            <a:schemeClr val="accent1"/>
-          </a:fillRef>
-          <a:effectRef idx="0">
-            <a:schemeClr val="accent1"/>
-          </a:effectRef>
-          <a:fontRef idx="minor">
-            <a:schemeClr val="lt1"/>
-          </a:fontRef>
-        </p:style>
-        <p:txBody>
-          <a:bodyPr rtlCol="0" anchor="ctr"/>
-          <a:lstStyle/>
-          <a:p>
-            <a:pPr algn="ctr"/>
-            <a:r>
-              <a:rPr lang="en-US" sz="1000" dirty="0"/>
-              <a:t>No</a:t>
-            </a:r>
-          </a:p>
-        </p:txBody>
-      </p:sp>
-      <p:sp>
-        <p:nvSpPr>
-          <p:cNvPr id="36" name="Rounded Rectangle 35">
-            <a:extLst>
-              <a:ext uri="{FF2B5EF4-FFF2-40B4-BE49-F238E27FC236}">
-                <a16:creationId xmlns:a16="http://schemas.microsoft.com/office/drawing/2014/main" id="{474CE556-90C8-C1D2-8848-B03EA41067FD}"/>
-              </a:ext>
-            </a:extLst>
-          </p:cNvPr>
-          <p:cNvSpPr/>
-          <p:nvPr/>
-        </p:nvSpPr>
-        <p:spPr>
-          <a:xfrm>
-            <a:off x="7404929" y="2318785"/>
-            <a:ext cx="527299" cy="302780"/>
-          </a:xfrm>
-          <a:prstGeom prst="roundRect">
-            <a:avLst/>
-          </a:prstGeom>
-          <a:solidFill>
-            <a:schemeClr val="accent1">
-              <a:lumMod val="75000"/>
-            </a:schemeClr>
-          </a:solidFill>
-          <a:ln>
-            <a:solidFill>
-              <a:schemeClr val="accent1">
-                <a:lumMod val="75000"/>
-              </a:schemeClr>
-            </a:solidFill>
-          </a:ln>
-        </p:spPr>
-        <p:style>
-          <a:lnRef idx="2">
-            <a:schemeClr val="accent1">
-              <a:shade val="50000"/>
-            </a:schemeClr>
-          </a:lnRef>
-          <a:fillRef idx="1">
-            <a:schemeClr val="accent1"/>
-          </a:fillRef>
-          <a:effectRef idx="0">
-            <a:schemeClr val="accent1"/>
-          </a:effectRef>
-          <a:fontRef idx="minor">
-            <a:schemeClr val="lt1"/>
-          </a:fontRef>
-        </p:style>
-        <p:txBody>
-          <a:bodyPr rtlCol="0" anchor="ctr"/>
-          <a:lstStyle/>
-          <a:p>
-            <a:pPr algn="ctr"/>
-            <a:r>
-              <a:rPr lang="en-US" sz="1000" dirty="0"/>
-              <a:t>No</a:t>
-            </a:r>
-          </a:p>
-        </p:txBody>
-      </p:sp>
-      <p:sp>
-        <p:nvSpPr>
-          <p:cNvPr id="37" name="Rounded Rectangle 36">
-            <a:extLst>
-              <a:ext uri="{FF2B5EF4-FFF2-40B4-BE49-F238E27FC236}">
-                <a16:creationId xmlns:a16="http://schemas.microsoft.com/office/drawing/2014/main" id="{AAF8651F-FA8B-7530-199D-8530360526A1}"/>
-              </a:ext>
-            </a:extLst>
-          </p:cNvPr>
-          <p:cNvSpPr/>
-          <p:nvPr/>
-        </p:nvSpPr>
-        <p:spPr>
-          <a:xfrm>
-            <a:off x="8029356" y="2318785"/>
-            <a:ext cx="527299" cy="302780"/>
-          </a:xfrm>
-          <a:prstGeom prst="roundRect">
-            <a:avLst/>
-          </a:prstGeom>
-          <a:solidFill>
-            <a:schemeClr val="accent1">
-              <a:lumMod val="60000"/>
-              <a:lumOff val="40000"/>
-            </a:schemeClr>
-          </a:solidFill>
-          <a:ln>
-            <a:solidFill>
-              <a:schemeClr val="accent1">
-                <a:lumMod val="60000"/>
-                <a:lumOff val="40000"/>
-              </a:schemeClr>
-            </a:solidFill>
-          </a:ln>
-        </p:spPr>
-        <p:style>
-          <a:lnRef idx="2">
-            <a:schemeClr val="accent1">
-              <a:shade val="50000"/>
-            </a:schemeClr>
-          </a:lnRef>
-          <a:fillRef idx="1">
-            <a:schemeClr val="accent1"/>
-          </a:fillRef>
-          <a:effectRef idx="0">
-            <a:schemeClr val="accent1"/>
-          </a:effectRef>
-          <a:fontRef idx="minor">
-            <a:schemeClr val="lt1"/>
-          </a:fontRef>
-        </p:style>
-        <p:txBody>
-          <a:bodyPr rtlCol="0" anchor="ctr"/>
-          <a:lstStyle/>
-          <a:p>
-            <a:pPr algn="ctr"/>
-            <a:r>
-              <a:rPr lang="en-US" sz="1000" dirty="0"/>
-              <a:t>No</a:t>
+          <p:cNvPr id="2" name="Title 1">
+            <a:extLst>
+              <a:ext uri="{FF2B5EF4-FFF2-40B4-BE49-F238E27FC236}">
+                <a16:creationId xmlns:a16="http://schemas.microsoft.com/office/drawing/2014/main" id="{6003B8D7-367B-BDF7-B9F3-344CEC4AE355}"/>
+              </a:ext>
+            </a:extLst>
+          </p:cNvPr>
+          <p:cNvSpPr>
+            <a:spLocks noGrp="1"/>
+          </p:cNvSpPr>
+          <p:nvPr>
+            <p:ph type="ctrTitle"/>
+          </p:nvPr>
+        </p:nvSpPr>
+        <p:spPr/>
+        <p:txBody>
+          <a:bodyPr/>
+          <a:lstStyle/>
+          <a:p>
+            <a:r>
+              <a:rPr lang="en-US" dirty="0"/>
+              <a:t>Decision Trees for Hospital Capacity Meeting</a:t>
+            </a:r>
+          </a:p>
+        </p:txBody>
+      </p:sp>
+      <p:sp>
+        <p:nvSpPr>
+          <p:cNvPr id="3" name="Subtitle 2">
+            <a:extLst>
+              <a:ext uri="{FF2B5EF4-FFF2-40B4-BE49-F238E27FC236}">
+                <a16:creationId xmlns:a16="http://schemas.microsoft.com/office/drawing/2014/main" id="{55614DA4-4A85-879F-13B7-848CCD251BAC}"/>
+              </a:ext>
+            </a:extLst>
+          </p:cNvPr>
+          <p:cNvSpPr>
+            <a:spLocks noGrp="1"/>
+          </p:cNvSpPr>
+          <p:nvPr>
+            <p:ph type="subTitle" idx="1"/>
+          </p:nvPr>
+        </p:nvSpPr>
+        <p:spPr/>
+        <p:txBody>
+          <a:bodyPr/>
+          <a:lstStyle/>
+          <a:p>
+            <a:r>
+              <a:rPr lang="en-US" dirty="0"/>
+              <a:t>18</a:t>
+            </a:r>
+            <a:r>
+              <a:rPr lang="en-US" baseline="30000" dirty="0"/>
+              <a:t>th</a:t>
+            </a:r>
+            <a:r>
+              <a:rPr lang="en-US" dirty="0"/>
+              <a:t> August 2023</a:t>
             </a:r>
           </a:p>
         </p:txBody>
@@ -5140,7 +3395,7 @@
     </p:spTree>
     <p:extLst>
       <p:ext uri="{BB962C8B-B14F-4D97-AF65-F5344CB8AC3E}">
-        <p14:creationId xmlns:p14="http://schemas.microsoft.com/office/powerpoint/2010/main" val="1587233291"/>
+        <p14:creationId xmlns:p14="http://schemas.microsoft.com/office/powerpoint/2010/main" val="1915602875"/>
       </p:ext>
     </p:extLst>
   </p:cSld>
@@ -5172,7 +3427,7 @@
           <p:cNvPr id="2" name="Title 1">
             <a:extLst>
               <a:ext uri="{FF2B5EF4-FFF2-40B4-BE49-F238E27FC236}">
-                <a16:creationId xmlns:a16="http://schemas.microsoft.com/office/drawing/2014/main" id="{D2D4DEA7-FCAE-8EEA-1E90-AEAFC57638BD}"/>
+                <a16:creationId xmlns:a16="http://schemas.microsoft.com/office/drawing/2014/main" id="{30F7287F-A870-5F65-A912-71744F5D53B6}"/>
               </a:ext>
             </a:extLst>
           </p:cNvPr>
@@ -5183,30 +3438,208 @@
             <p:ph type="title"/>
           </p:nvPr>
         </p:nvSpPr>
-        <p:spPr/>
+        <p:spPr>
+          <a:xfrm>
+            <a:off x="169606" y="18255"/>
+            <a:ext cx="10515600" cy="1325563"/>
+          </a:xfrm>
+        </p:spPr>
         <p:txBody>
           <a:bodyPr/>
           <a:lstStyle/>
           <a:p>
-            <a:endParaRPr lang="en-US"/>
+            <a:r>
+              <a:rPr lang="en-US" dirty="0"/>
+              <a:t>Recap</a:t>
+            </a:r>
+          </a:p>
+        </p:txBody>
+      </p:sp>
+      <p:sp>
+        <p:nvSpPr>
+          <p:cNvPr id="3" name="Content Placeholder 2">
+            <a:extLst>
+              <a:ext uri="{FF2B5EF4-FFF2-40B4-BE49-F238E27FC236}">
+                <a16:creationId xmlns:a16="http://schemas.microsoft.com/office/drawing/2014/main" id="{ECDB9777-ED56-9109-1C91-AC760C116F42}"/>
+              </a:ext>
+            </a:extLst>
+          </p:cNvPr>
+          <p:cNvSpPr>
+            <a:spLocks noGrp="1"/>
+          </p:cNvSpPr>
+          <p:nvPr>
+            <p:ph idx="1"/>
+          </p:nvPr>
+        </p:nvSpPr>
+        <p:spPr>
+          <a:xfrm>
+            <a:off x="838200" y="1107870"/>
+            <a:ext cx="10515600" cy="5214272"/>
+          </a:xfrm>
+        </p:spPr>
+        <p:txBody>
+          <a:bodyPr>
+            <a:normAutofit/>
+          </a:bodyPr>
+          <a:lstStyle/>
+          <a:p>
+            <a:r>
+              <a:rPr lang="en-US" dirty="0"/>
+              <a:t>Have three broad categories of classifiers covering three time periods </a:t>
+            </a:r>
+          </a:p>
+          <a:p>
+            <a:pPr lvl="2"/>
+            <a:r>
+              <a:rPr lang="en-US" dirty="0"/>
+              <a:t>“Naïve” classifier: only uses whether current hospital capacity exceeds 15/100k</a:t>
+            </a:r>
+          </a:p>
+          <a:p>
+            <a:pPr lvl="2"/>
+            <a:r>
+              <a:rPr lang="en-US" dirty="0"/>
+              <a:t>“Optimized CDC” classifier: uses new weekly COVID-19 cases, hospital admissions, and the percent of inpatient beds used by COVID-19 patients</a:t>
+            </a:r>
+          </a:p>
+          <a:p>
+            <a:pPr lvl="4"/>
+            <a:r>
+              <a:rPr lang="en-US" dirty="0"/>
+              <a:t>+ “Enhanced” classifier which uses whether current hospital capacity exceeds 15/100k</a:t>
+            </a:r>
+          </a:p>
+          <a:p>
+            <a:pPr lvl="2"/>
+            <a:r>
+              <a:rPr lang="en-US" dirty="0"/>
+              <a:t>“Full” classifier with cases, deaths, admissions, beds, ICU beds, % of beds, change in these metrics, and whether current capacity exceeds threshold</a:t>
+            </a:r>
+            <a:endParaRPr lang="en-US" b="0" i="0" dirty="0">
+              <a:solidFill>
+                <a:srgbClr val="374151"/>
+              </a:solidFill>
+              <a:effectLst/>
+              <a:latin typeface="Söhne"/>
+            </a:endParaRPr>
+          </a:p>
+          <a:p>
+            <a:pPr marL="914400" lvl="2" indent="0">
+              <a:buNone/>
+            </a:pPr>
+            <a:endParaRPr lang="en-US" dirty="0"/>
+          </a:p>
+          <a:p>
+            <a:pPr marL="914400" lvl="2" indent="0">
+              <a:buNone/>
+            </a:pPr>
+            <a:endParaRPr lang="en-US" dirty="0"/>
+          </a:p>
+          <a:p>
+            <a:r>
+              <a:rPr lang="en-US" dirty="0"/>
+              <a:t>Three possible time periods: </a:t>
+            </a:r>
+          </a:p>
+          <a:p>
+            <a:pPr lvl="2"/>
+            <a:r>
+              <a:rPr lang="en-US" dirty="0"/>
+              <a:t>Period</a:t>
+            </a:r>
+          </a:p>
+          <a:p>
+            <a:pPr lvl="2"/>
+            <a:r>
+              <a:rPr lang="en-US" dirty="0"/>
+              <a:t>Exact </a:t>
+            </a:r>
+          </a:p>
+          <a:p>
+            <a:pPr lvl="2"/>
+            <a:r>
+              <a:rPr lang="en-US" dirty="0"/>
+              <a:t>Shifted</a:t>
+            </a:r>
+          </a:p>
+        </p:txBody>
+      </p:sp>
+    </p:spTree>
+    <p:extLst>
+      <p:ext uri="{BB962C8B-B14F-4D97-AF65-F5344CB8AC3E}">
+        <p14:creationId xmlns:p14="http://schemas.microsoft.com/office/powerpoint/2010/main" val="1914296055"/>
+      </p:ext>
+    </p:extLst>
+  </p:cSld>
+  <p:clrMapOvr>
+    <a:masterClrMapping/>
+  </p:clrMapOvr>
+</p:sld>
+</file>
+
+<file path=ppt/slides/slide3.xml><?xml version="1.0" encoding="utf-8"?>
+<p:sld xmlns:a="http://schemas.openxmlformats.org/drawingml/2006/main" xmlns:r="http://schemas.openxmlformats.org/officeDocument/2006/relationships" xmlns:p="http://schemas.openxmlformats.org/presentationml/2006/main">
+  <p:cSld>
+    <p:spTree>
+      <p:nvGrpSpPr>
+        <p:cNvPr id="1" name=""/>
+        <p:cNvGrpSpPr/>
+        <p:nvPr/>
+      </p:nvGrpSpPr>
+      <p:grpSpPr>
+        <a:xfrm>
+          <a:off x="0" y="0"/>
+          <a:ext cx="0" cy="0"/>
+          <a:chOff x="0" y="0"/>
+          <a:chExt cx="0" cy="0"/>
+        </a:xfrm>
+      </p:grpSpPr>
+      <p:sp>
+        <p:nvSpPr>
+          <p:cNvPr id="2" name="Title 1">
+            <a:extLst>
+              <a:ext uri="{FF2B5EF4-FFF2-40B4-BE49-F238E27FC236}">
+                <a16:creationId xmlns:a16="http://schemas.microsoft.com/office/drawing/2014/main" id="{30A86A5B-63D3-460F-9750-DA6B254BA9B9}"/>
+              </a:ext>
+            </a:extLst>
+          </p:cNvPr>
+          <p:cNvSpPr>
+            <a:spLocks noGrp="1"/>
+          </p:cNvSpPr>
+          <p:nvPr>
+            <p:ph type="title"/>
+          </p:nvPr>
+        </p:nvSpPr>
+        <p:spPr>
+          <a:xfrm>
+            <a:off x="0" y="18255"/>
+            <a:ext cx="10515600" cy="1325563"/>
+          </a:xfrm>
+        </p:spPr>
+        <p:txBody>
+          <a:bodyPr/>
+          <a:lstStyle/>
+          <a:p>
+            <a:r>
+              <a:rPr lang="en-US" dirty="0"/>
+              <a:t>Complexity vs performance </a:t>
+            </a:r>
           </a:p>
         </p:txBody>
       </p:sp>
       <p:pic>
         <p:nvPicPr>
-          <p:cNvPr id="5" name="Content Placeholder 4" descr="A diagram of a structure&#10;&#10;Description automatically generated">
-            <a:extLst>
-              <a:ext uri="{FF2B5EF4-FFF2-40B4-BE49-F238E27FC236}">
-                <a16:creationId xmlns:a16="http://schemas.microsoft.com/office/drawing/2014/main" id="{1E303882-28A2-5110-EF16-F87C34CDEB92}"/>
+          <p:cNvPr id="4" name="Picture 3" descr="A diagram of a company&#10;&#10;Description automatically generated">
+            <a:extLst>
+              <a:ext uri="{FF2B5EF4-FFF2-40B4-BE49-F238E27FC236}">
+                <a16:creationId xmlns:a16="http://schemas.microsoft.com/office/drawing/2014/main" id="{C65ABD30-F932-FB99-763A-82115878AE65}"/>
               </a:ext>
             </a:extLst>
           </p:cNvPr>
           <p:cNvPicPr>
-            <a:picLocks noGrp="1" noChangeAspect="1"/>
+            <a:picLocks noChangeAspect="1"/>
           </p:cNvPicPr>
-          <p:nvPr>
-            <p:ph idx="1"/>
-          </p:nvPr>
+          <p:nvPr/>
         </p:nvPicPr>
         <p:blipFill>
           <a:blip r:embed="rId2"/>
@@ -5216,15 +3649,2058 @@
         </p:blipFill>
         <p:spPr>
           <a:xfrm>
-            <a:off x="-245829" y="0"/>
-            <a:ext cx="12314031" cy="9235523"/>
+            <a:off x="295786" y="1413772"/>
+            <a:ext cx="9640448" cy="1870201"/>
           </a:xfrm>
+          <a:prstGeom prst="rect">
+            <a:avLst/>
+          </a:prstGeom>
+        </p:spPr>
+      </p:pic>
+      <p:sp>
+        <p:nvSpPr>
+          <p:cNvPr id="6" name="TextBox 5">
+            <a:extLst>
+              <a:ext uri="{FF2B5EF4-FFF2-40B4-BE49-F238E27FC236}">
+                <a16:creationId xmlns:a16="http://schemas.microsoft.com/office/drawing/2014/main" id="{8F858D68-BE80-09EC-C566-B8599F2BE5C6}"/>
+              </a:ext>
+            </a:extLst>
+          </p:cNvPr>
+          <p:cNvSpPr txBox="1"/>
+          <p:nvPr/>
+        </p:nvSpPr>
+        <p:spPr>
+          <a:xfrm>
+            <a:off x="295786" y="3726388"/>
+            <a:ext cx="5260258" cy="1754326"/>
+          </a:xfrm>
+          <a:prstGeom prst="rect">
+            <a:avLst/>
+          </a:prstGeom>
+          <a:noFill/>
+        </p:spPr>
+        <p:txBody>
+          <a:bodyPr wrap="square" rtlCol="0">
+            <a:spAutoFit/>
+          </a:bodyPr>
+          <a:lstStyle/>
+          <a:p>
+            <a:pPr marL="285750" indent="-285750">
+              <a:buFont typeface="Arial" panose="020B0604020202020204" pitchFamily="34" charset="0"/>
+              <a:buChar char="•"/>
+            </a:pPr>
+            <a:r>
+              <a:rPr lang="en-US" dirty="0"/>
+              <a:t>“Full” classifier, 3-week period </a:t>
+            </a:r>
+          </a:p>
+          <a:p>
+            <a:pPr marL="285750" indent="-285750">
+              <a:buFont typeface="Arial" panose="020B0604020202020204" pitchFamily="34" charset="0"/>
+              <a:buChar char="•"/>
+            </a:pPr>
+            <a:r>
+              <a:rPr lang="en-US" dirty="0"/>
+              <a:t>Cost complexity pruning using 10-fold cross validation</a:t>
+            </a:r>
+          </a:p>
+          <a:p>
+            <a:pPr marL="285750" indent="-285750">
+              <a:buFont typeface="Arial" panose="020B0604020202020204" pitchFamily="34" charset="0"/>
+              <a:buChar char="•"/>
+            </a:pPr>
+            <a:r>
+              <a:rPr lang="en-US" dirty="0"/>
+              <a:t>Harder to interpret…</a:t>
+            </a:r>
+          </a:p>
+          <a:p>
+            <a:pPr marL="285750" indent="-285750">
+              <a:buFont typeface="Arial" panose="020B0604020202020204" pitchFamily="34" charset="0"/>
+              <a:buChar char="•"/>
+            </a:pPr>
+            <a:endParaRPr lang="en-US" dirty="0"/>
+          </a:p>
+          <a:p>
+            <a:pPr marL="285750" indent="-285750">
+              <a:buFont typeface="Arial" panose="020B0604020202020204" pitchFamily="34" charset="0"/>
+              <a:buChar char="•"/>
+            </a:pPr>
+            <a:endParaRPr lang="en-US" dirty="0"/>
+          </a:p>
+        </p:txBody>
+      </p:sp>
+    </p:spTree>
+    <p:extLst>
+      <p:ext uri="{BB962C8B-B14F-4D97-AF65-F5344CB8AC3E}">
+        <p14:creationId xmlns:p14="http://schemas.microsoft.com/office/powerpoint/2010/main" val="4127999338"/>
+      </p:ext>
+    </p:extLst>
+  </p:cSld>
+  <p:clrMapOvr>
+    <a:masterClrMapping/>
+  </p:clrMapOvr>
+</p:sld>
+</file>
+
+<file path=ppt/slides/slide4.xml><?xml version="1.0" encoding="utf-8"?>
+<p:sld xmlns:a="http://schemas.openxmlformats.org/drawingml/2006/main" xmlns:r="http://schemas.openxmlformats.org/officeDocument/2006/relationships" xmlns:p="http://schemas.openxmlformats.org/presentationml/2006/main">
+  <p:cSld>
+    <p:spTree>
+      <p:nvGrpSpPr>
+        <p:cNvPr id="1" name=""/>
+        <p:cNvGrpSpPr/>
+        <p:nvPr/>
+      </p:nvGrpSpPr>
+      <p:grpSpPr>
+        <a:xfrm>
+          <a:off x="0" y="0"/>
+          <a:ext cx="0" cy="0"/>
+          <a:chOff x="0" y="0"/>
+          <a:chExt cx="0" cy="0"/>
+        </a:xfrm>
+      </p:grpSpPr>
+      <p:pic>
+        <p:nvPicPr>
+          <p:cNvPr id="9" name="Picture 8" descr="A diagram of a data flow&#10;&#10;Description automatically generated with medium confidence">
+            <a:extLst>
+              <a:ext uri="{FF2B5EF4-FFF2-40B4-BE49-F238E27FC236}">
+                <a16:creationId xmlns:a16="http://schemas.microsoft.com/office/drawing/2014/main" id="{952B6E07-4D31-B5B2-2A51-792592CAE10E}"/>
+              </a:ext>
+            </a:extLst>
+          </p:cNvPr>
+          <p:cNvPicPr>
+            <a:picLocks noChangeAspect="1"/>
+          </p:cNvPicPr>
+          <p:nvPr/>
+        </p:nvPicPr>
+        <p:blipFill>
+          <a:blip r:embed="rId2"/>
+          <a:stretch>
+            <a:fillRect/>
+          </a:stretch>
+        </p:blipFill>
+        <p:spPr>
+          <a:xfrm>
+            <a:off x="4112021" y="769381"/>
+            <a:ext cx="5327904" cy="3995928"/>
+          </a:xfrm>
+          <a:prstGeom prst="rect">
+            <a:avLst/>
+          </a:prstGeom>
+        </p:spPr>
+      </p:pic>
+      <p:sp>
+        <p:nvSpPr>
+          <p:cNvPr id="10" name="TextBox 9">
+            <a:extLst>
+              <a:ext uri="{FF2B5EF4-FFF2-40B4-BE49-F238E27FC236}">
+                <a16:creationId xmlns:a16="http://schemas.microsoft.com/office/drawing/2014/main" id="{636BA992-21ED-1C8B-CF55-4668CA704CA0}"/>
+              </a:ext>
+            </a:extLst>
+          </p:cNvPr>
+          <p:cNvSpPr txBox="1"/>
+          <p:nvPr/>
+        </p:nvSpPr>
+        <p:spPr>
+          <a:xfrm>
+            <a:off x="453102" y="4611291"/>
+            <a:ext cx="6046020" cy="1477328"/>
+          </a:xfrm>
+          <a:prstGeom prst="rect">
+            <a:avLst/>
+          </a:prstGeom>
+          <a:noFill/>
+        </p:spPr>
+        <p:txBody>
+          <a:bodyPr wrap="square" rtlCol="0">
+            <a:spAutoFit/>
+          </a:bodyPr>
+          <a:lstStyle/>
+          <a:p>
+            <a:pPr marL="285750" indent="-285750">
+              <a:buFont typeface="Arial" panose="020B0604020202020204" pitchFamily="34" charset="0"/>
+              <a:buChar char="•"/>
+            </a:pPr>
+            <a:r>
+              <a:rPr lang="en-US" dirty="0"/>
+              <a:t>“Full” classifier, 3-week period </a:t>
+            </a:r>
+          </a:p>
+          <a:p>
+            <a:pPr marL="285750" indent="-285750">
+              <a:buFont typeface="Arial" panose="020B0604020202020204" pitchFamily="34" charset="0"/>
+              <a:buChar char="•"/>
+            </a:pPr>
+            <a:r>
+              <a:rPr lang="en-US" dirty="0"/>
+              <a:t>Overfitting minimized by setting max. depth of tree to 4</a:t>
+            </a:r>
+          </a:p>
+          <a:p>
+            <a:pPr marL="285750" indent="-285750">
+              <a:buFont typeface="Arial" panose="020B0604020202020204" pitchFamily="34" charset="0"/>
+              <a:buChar char="•"/>
+            </a:pPr>
+            <a:r>
+              <a:rPr lang="en-US" dirty="0"/>
+              <a:t>Easier to interpret…</a:t>
+            </a:r>
+          </a:p>
+          <a:p>
+            <a:pPr marL="285750" indent="-285750">
+              <a:buFont typeface="Arial" panose="020B0604020202020204" pitchFamily="34" charset="0"/>
+              <a:buChar char="•"/>
+            </a:pPr>
+            <a:endParaRPr lang="en-US" dirty="0"/>
+          </a:p>
+          <a:p>
+            <a:pPr marL="285750" indent="-285750">
+              <a:buFont typeface="Arial" panose="020B0604020202020204" pitchFamily="34" charset="0"/>
+              <a:buChar char="•"/>
+            </a:pPr>
+            <a:endParaRPr lang="en-US" dirty="0"/>
+          </a:p>
+        </p:txBody>
+      </p:sp>
+      <p:sp>
+        <p:nvSpPr>
+          <p:cNvPr id="11" name="Title 1">
+            <a:extLst>
+              <a:ext uri="{FF2B5EF4-FFF2-40B4-BE49-F238E27FC236}">
+                <a16:creationId xmlns:a16="http://schemas.microsoft.com/office/drawing/2014/main" id="{8869EFE1-7321-5781-01FB-C94EF9DEBEF1}"/>
+              </a:ext>
+            </a:extLst>
+          </p:cNvPr>
+          <p:cNvSpPr>
+            <a:spLocks noGrp="1"/>
+          </p:cNvSpPr>
+          <p:nvPr>
+            <p:ph type="title"/>
+          </p:nvPr>
+        </p:nvSpPr>
+        <p:spPr>
+          <a:xfrm>
+            <a:off x="0" y="18255"/>
+            <a:ext cx="10515600" cy="1325563"/>
+          </a:xfrm>
+        </p:spPr>
+        <p:txBody>
+          <a:bodyPr/>
+          <a:lstStyle/>
+          <a:p>
+            <a:r>
+              <a:rPr lang="en-US" dirty="0"/>
+              <a:t>Complexity vs performance </a:t>
+            </a:r>
+          </a:p>
+        </p:txBody>
+      </p:sp>
+    </p:spTree>
+    <p:extLst>
+      <p:ext uri="{BB962C8B-B14F-4D97-AF65-F5344CB8AC3E}">
+        <p14:creationId xmlns:p14="http://schemas.microsoft.com/office/powerpoint/2010/main" val="1072815005"/>
+      </p:ext>
+    </p:extLst>
+  </p:cSld>
+  <p:clrMapOvr>
+    <a:masterClrMapping/>
+  </p:clrMapOvr>
+</p:sld>
+</file>
+
+<file path=ppt/slides/slide5.xml><?xml version="1.0" encoding="utf-8"?>
+<p:sld xmlns:a="http://schemas.openxmlformats.org/drawingml/2006/main" xmlns:r="http://schemas.openxmlformats.org/officeDocument/2006/relationships" xmlns:p="http://schemas.openxmlformats.org/presentationml/2006/main">
+  <p:cSld>
+    <p:spTree>
+      <p:nvGrpSpPr>
+        <p:cNvPr id="1" name=""/>
+        <p:cNvGrpSpPr/>
+        <p:nvPr/>
+      </p:nvGrpSpPr>
+      <p:grpSpPr>
+        <a:xfrm>
+          <a:off x="0" y="0"/>
+          <a:ext cx="0" cy="0"/>
+          <a:chOff x="0" y="0"/>
+          <a:chExt cx="0" cy="0"/>
+        </a:xfrm>
+      </p:grpSpPr>
+      <p:sp>
+        <p:nvSpPr>
+          <p:cNvPr id="2" name="Title 1">
+            <a:extLst>
+              <a:ext uri="{FF2B5EF4-FFF2-40B4-BE49-F238E27FC236}">
+                <a16:creationId xmlns:a16="http://schemas.microsoft.com/office/drawing/2014/main" id="{51085FB1-54DA-419C-86D5-02003533EE65}"/>
+              </a:ext>
+            </a:extLst>
+          </p:cNvPr>
+          <p:cNvSpPr>
+            <a:spLocks noGrp="1"/>
+          </p:cNvSpPr>
+          <p:nvPr>
+            <p:ph type="title"/>
+          </p:nvPr>
+        </p:nvSpPr>
+        <p:spPr>
+          <a:xfrm>
+            <a:off x="0" y="18255"/>
+            <a:ext cx="10515600" cy="1325563"/>
+          </a:xfrm>
+        </p:spPr>
+        <p:txBody>
+          <a:bodyPr/>
+          <a:lstStyle/>
+          <a:p>
+            <a:r>
+              <a:rPr lang="en-US" dirty="0"/>
+              <a:t>“Restricted” classifier – max. depth of 4</a:t>
+            </a:r>
+          </a:p>
+        </p:txBody>
+      </p:sp>
+      <p:graphicFrame>
+        <p:nvGraphicFramePr>
+          <p:cNvPr id="4" name="Table 4">
+            <a:extLst>
+              <a:ext uri="{FF2B5EF4-FFF2-40B4-BE49-F238E27FC236}">
+                <a16:creationId xmlns:a16="http://schemas.microsoft.com/office/drawing/2014/main" id="{BA72B0B8-A3FF-D6E4-C11C-5C37DBB4347C}"/>
+              </a:ext>
+            </a:extLst>
+          </p:cNvPr>
+          <p:cNvGraphicFramePr>
+            <a:graphicFrameLocks noGrp="1"/>
+          </p:cNvGraphicFramePr>
+          <p:nvPr>
+            <p:extLst>
+              <p:ext uri="{D42A27DB-BD31-4B8C-83A1-F6EECF244321}">
+                <p14:modId xmlns:p14="http://schemas.microsoft.com/office/powerpoint/2010/main" val="4274309665"/>
+              </p:ext>
+            </p:extLst>
+          </p:nvPr>
+        </p:nvGraphicFramePr>
+        <p:xfrm>
+          <a:off x="1278835" y="1343818"/>
+          <a:ext cx="8128001" cy="1752600"/>
+        </p:xfrm>
+        <a:graphic>
+          <a:graphicData uri="http://schemas.openxmlformats.org/drawingml/2006/table">
+            <a:tbl>
+              <a:tblPr firstRow="1" bandRow="1">
+                <a:tableStyleId>{2D5ABB26-0587-4C30-8999-92F81FD0307C}</a:tableStyleId>
+              </a:tblPr>
+              <a:tblGrid>
+                <a:gridCol w="1161143">
+                  <a:extLst>
+                    <a:ext uri="{9D8B030D-6E8A-4147-A177-3AD203B41FA5}">
+                      <a16:colId xmlns:a16="http://schemas.microsoft.com/office/drawing/2014/main" val="824944320"/>
+                    </a:ext>
+                  </a:extLst>
+                </a:gridCol>
+                <a:gridCol w="1161143">
+                  <a:extLst>
+                    <a:ext uri="{9D8B030D-6E8A-4147-A177-3AD203B41FA5}">
+                      <a16:colId xmlns:a16="http://schemas.microsoft.com/office/drawing/2014/main" val="2748953951"/>
+                    </a:ext>
+                  </a:extLst>
+                </a:gridCol>
+                <a:gridCol w="1161143">
+                  <a:extLst>
+                    <a:ext uri="{9D8B030D-6E8A-4147-A177-3AD203B41FA5}">
+                      <a16:colId xmlns:a16="http://schemas.microsoft.com/office/drawing/2014/main" val="785175940"/>
+                    </a:ext>
+                  </a:extLst>
+                </a:gridCol>
+                <a:gridCol w="1161143">
+                  <a:extLst>
+                    <a:ext uri="{9D8B030D-6E8A-4147-A177-3AD203B41FA5}">
+                      <a16:colId xmlns:a16="http://schemas.microsoft.com/office/drawing/2014/main" val="235284738"/>
+                    </a:ext>
+                  </a:extLst>
+                </a:gridCol>
+                <a:gridCol w="1161143">
+                  <a:extLst>
+                    <a:ext uri="{9D8B030D-6E8A-4147-A177-3AD203B41FA5}">
+                      <a16:colId xmlns:a16="http://schemas.microsoft.com/office/drawing/2014/main" val="2699499033"/>
+                    </a:ext>
+                  </a:extLst>
+                </a:gridCol>
+                <a:gridCol w="1161143">
+                  <a:extLst>
+                    <a:ext uri="{9D8B030D-6E8A-4147-A177-3AD203B41FA5}">
+                      <a16:colId xmlns:a16="http://schemas.microsoft.com/office/drawing/2014/main" val="1453944038"/>
+                    </a:ext>
+                  </a:extLst>
+                </a:gridCol>
+                <a:gridCol w="1161143">
+                  <a:extLst>
+                    <a:ext uri="{9D8B030D-6E8A-4147-A177-3AD203B41FA5}">
+                      <a16:colId xmlns:a16="http://schemas.microsoft.com/office/drawing/2014/main" val="3394038029"/>
+                    </a:ext>
+                  </a:extLst>
+                </a:gridCol>
+              </a:tblGrid>
+              <a:tr h="370840">
+                <a:tc>
+                  <a:txBody>
+                    <a:bodyPr/>
+                    <a:lstStyle/>
+                    <a:p>
+                      <a:endParaRPr lang="en-US" dirty="0"/>
+                    </a:p>
+                  </a:txBody>
+                  <a:tcPr/>
+                </a:tc>
+                <a:tc>
+                  <a:txBody>
+                    <a:bodyPr/>
+                    <a:lstStyle/>
+                    <a:p>
+                      <a:r>
+                        <a:rPr lang="en-US" dirty="0" err="1"/>
+                        <a:t>auROC</a:t>
+                      </a:r>
+                      <a:endParaRPr lang="en-US" dirty="0"/>
+                    </a:p>
+                  </a:txBody>
+                  <a:tcPr/>
+                </a:tc>
+                <a:tc>
+                  <a:txBody>
+                    <a:bodyPr/>
+                    <a:lstStyle/>
+                    <a:p>
+                      <a:r>
+                        <a:rPr lang="en-US" dirty="0"/>
+                        <a:t>Accuracy</a:t>
+                      </a:r>
+                    </a:p>
+                  </a:txBody>
+                  <a:tcPr/>
+                </a:tc>
+                <a:tc>
+                  <a:txBody>
+                    <a:bodyPr/>
+                    <a:lstStyle/>
+                    <a:p>
+                      <a:r>
+                        <a:rPr lang="en-US" dirty="0"/>
+                        <a:t>Sensitivity</a:t>
+                      </a:r>
+                    </a:p>
+                  </a:txBody>
+                  <a:tcPr/>
+                </a:tc>
+                <a:tc>
+                  <a:txBody>
+                    <a:bodyPr/>
+                    <a:lstStyle/>
+                    <a:p>
+                      <a:r>
+                        <a:rPr lang="en-US" dirty="0"/>
+                        <a:t>Specificity</a:t>
+                      </a:r>
+                    </a:p>
+                  </a:txBody>
+                  <a:tcPr/>
+                </a:tc>
+                <a:tc>
+                  <a:txBody>
+                    <a:bodyPr/>
+                    <a:lstStyle/>
+                    <a:p>
+                      <a:r>
+                        <a:rPr lang="en-US" dirty="0"/>
+                        <a:t>PPV</a:t>
+                      </a:r>
+                    </a:p>
+                  </a:txBody>
+                  <a:tcPr/>
+                </a:tc>
+                <a:tc>
+                  <a:txBody>
+                    <a:bodyPr/>
+                    <a:lstStyle/>
+                    <a:p>
+                      <a:r>
+                        <a:rPr lang="en-US" dirty="0"/>
+                        <a:t>NPV</a:t>
+                      </a:r>
+                    </a:p>
+                  </a:txBody>
+                  <a:tcPr/>
+                </a:tc>
+                <a:extLst>
+                  <a:ext uri="{0D108BD9-81ED-4DB2-BD59-A6C34878D82A}">
+                    <a16:rowId xmlns:a16="http://schemas.microsoft.com/office/drawing/2014/main" val="3948302610"/>
+                  </a:ext>
+                </a:extLst>
+              </a:tr>
+              <a:tr h="370840">
+                <a:tc>
+                  <a:txBody>
+                    <a:bodyPr/>
+                    <a:lstStyle/>
+                    <a:p>
+                      <a:r>
+                        <a:rPr lang="en-US" dirty="0"/>
+                        <a:t>Pruned</a:t>
+                      </a:r>
+                    </a:p>
+                  </a:txBody>
+                  <a:tcPr/>
+                </a:tc>
+                <a:tc>
+                  <a:txBody>
+                    <a:bodyPr/>
+                    <a:lstStyle/>
+                    <a:p>
+                      <a:r>
+                        <a:rPr lang="en-US" dirty="0"/>
+                        <a:t>0.839</a:t>
+                      </a:r>
+                    </a:p>
+                  </a:txBody>
+                  <a:tcPr/>
+                </a:tc>
+                <a:tc>
+                  <a:txBody>
+                    <a:bodyPr/>
+                    <a:lstStyle/>
+                    <a:p>
+                      <a:r>
+                        <a:rPr lang="en-US" dirty="0"/>
+                        <a:t>0.803</a:t>
+                      </a:r>
+                    </a:p>
+                  </a:txBody>
+                  <a:tcPr/>
+                </a:tc>
+                <a:tc>
+                  <a:txBody>
+                    <a:bodyPr/>
+                    <a:lstStyle/>
+                    <a:p>
+                      <a:r>
+                        <a:rPr lang="en-US" dirty="0"/>
+                        <a:t>0.779</a:t>
+                      </a:r>
+                    </a:p>
+                  </a:txBody>
+                  <a:tcPr/>
+                </a:tc>
+                <a:tc>
+                  <a:txBody>
+                    <a:bodyPr/>
+                    <a:lstStyle/>
+                    <a:p>
+                      <a:r>
+                        <a:rPr lang="en-US" dirty="0"/>
+                        <a:t>0.899</a:t>
+                      </a:r>
+                    </a:p>
+                  </a:txBody>
+                  <a:tcPr/>
+                </a:tc>
+                <a:tc>
+                  <a:txBody>
+                    <a:bodyPr/>
+                    <a:lstStyle/>
+                    <a:p>
+                      <a:r>
+                        <a:rPr lang="en-US" dirty="0"/>
+                        <a:t>0.967</a:t>
+                      </a:r>
+                    </a:p>
+                  </a:txBody>
+                  <a:tcPr/>
+                </a:tc>
+                <a:tc>
+                  <a:txBody>
+                    <a:bodyPr/>
+                    <a:lstStyle/>
+                    <a:p>
+                      <a:r>
+                        <a:rPr lang="en-US" dirty="0"/>
+                        <a:t>0.502</a:t>
+                      </a:r>
+                    </a:p>
+                  </a:txBody>
+                  <a:tcPr/>
+                </a:tc>
+                <a:extLst>
+                  <a:ext uri="{0D108BD9-81ED-4DB2-BD59-A6C34878D82A}">
+                    <a16:rowId xmlns:a16="http://schemas.microsoft.com/office/drawing/2014/main" val="872319945"/>
+                  </a:ext>
+                </a:extLst>
+              </a:tr>
+              <a:tr h="370840">
+                <a:tc>
+                  <a:txBody>
+                    <a:bodyPr/>
+                    <a:lstStyle/>
+                    <a:p>
+                      <a:r>
+                        <a:rPr lang="en-US" dirty="0"/>
+                        <a:t>Max.  depth</a:t>
+                      </a:r>
+                    </a:p>
+                  </a:txBody>
+                  <a:tcPr/>
+                </a:tc>
+                <a:tc>
+                  <a:txBody>
+                    <a:bodyPr/>
+                    <a:lstStyle/>
+                    <a:p>
+                      <a:r>
+                        <a:rPr lang="en-US" dirty="0"/>
+                        <a:t>0.83</a:t>
+                      </a:r>
+                    </a:p>
+                  </a:txBody>
+                  <a:tcPr/>
+                </a:tc>
+                <a:tc>
+                  <a:txBody>
+                    <a:bodyPr/>
+                    <a:lstStyle/>
+                    <a:p>
+                      <a:r>
+                        <a:rPr lang="en-US" dirty="0"/>
+                        <a:t>0.80</a:t>
+                      </a:r>
+                    </a:p>
+                  </a:txBody>
+                  <a:tcPr/>
+                </a:tc>
+                <a:tc>
+                  <a:txBody>
+                    <a:bodyPr/>
+                    <a:lstStyle/>
+                    <a:p>
+                      <a:r>
+                        <a:rPr lang="en-US" dirty="0"/>
+                        <a:t>0.77</a:t>
+                      </a:r>
+                    </a:p>
+                  </a:txBody>
+                  <a:tcPr/>
+                </a:tc>
+                <a:tc>
+                  <a:txBody>
+                    <a:bodyPr/>
+                    <a:lstStyle/>
+                    <a:p>
+                      <a:r>
+                        <a:rPr lang="en-US" dirty="0"/>
+                        <a:t>0.89</a:t>
+                      </a:r>
+                    </a:p>
+                  </a:txBody>
+                  <a:tcPr/>
+                </a:tc>
+                <a:tc>
+                  <a:txBody>
+                    <a:bodyPr/>
+                    <a:lstStyle/>
+                    <a:p>
+                      <a:r>
+                        <a:rPr lang="en-US" dirty="0"/>
+                        <a:t>0.97</a:t>
+                      </a:r>
+                    </a:p>
+                  </a:txBody>
+                  <a:tcPr/>
+                </a:tc>
+                <a:tc>
+                  <a:txBody>
+                    <a:bodyPr/>
+                    <a:lstStyle/>
+                    <a:p>
+                      <a:r>
+                        <a:rPr lang="en-US" dirty="0"/>
+                        <a:t>0.49</a:t>
+                      </a:r>
+                    </a:p>
+                  </a:txBody>
+                  <a:tcPr/>
+                </a:tc>
+                <a:extLst>
+                  <a:ext uri="{0D108BD9-81ED-4DB2-BD59-A6C34878D82A}">
+                    <a16:rowId xmlns:a16="http://schemas.microsoft.com/office/drawing/2014/main" val="2752551909"/>
+                  </a:ext>
+                </a:extLst>
+              </a:tr>
+              <a:tr h="370840">
+                <a:tc>
+                  <a:txBody>
+                    <a:bodyPr/>
+                    <a:lstStyle/>
+                    <a:p>
+                      <a:endParaRPr lang="en-US"/>
+                    </a:p>
+                  </a:txBody>
+                  <a:tcPr/>
+                </a:tc>
+                <a:tc>
+                  <a:txBody>
+                    <a:bodyPr/>
+                    <a:lstStyle/>
+                    <a:p>
+                      <a:endParaRPr lang="en-US"/>
+                    </a:p>
+                  </a:txBody>
+                  <a:tcPr/>
+                </a:tc>
+                <a:tc>
+                  <a:txBody>
+                    <a:bodyPr/>
+                    <a:lstStyle/>
+                    <a:p>
+                      <a:endParaRPr lang="en-US" dirty="0"/>
+                    </a:p>
+                  </a:txBody>
+                  <a:tcPr/>
+                </a:tc>
+                <a:tc>
+                  <a:txBody>
+                    <a:bodyPr/>
+                    <a:lstStyle/>
+                    <a:p>
+                      <a:endParaRPr lang="en-US"/>
+                    </a:p>
+                  </a:txBody>
+                  <a:tcPr/>
+                </a:tc>
+                <a:tc>
+                  <a:txBody>
+                    <a:bodyPr/>
+                    <a:lstStyle/>
+                    <a:p>
+                      <a:endParaRPr lang="en-US"/>
+                    </a:p>
+                  </a:txBody>
+                  <a:tcPr/>
+                </a:tc>
+                <a:tc>
+                  <a:txBody>
+                    <a:bodyPr/>
+                    <a:lstStyle/>
+                    <a:p>
+                      <a:endParaRPr lang="en-US"/>
+                    </a:p>
+                  </a:txBody>
+                  <a:tcPr/>
+                </a:tc>
+                <a:tc>
+                  <a:txBody>
+                    <a:bodyPr/>
+                    <a:lstStyle/>
+                    <a:p>
+                      <a:endParaRPr lang="en-US" dirty="0"/>
+                    </a:p>
+                  </a:txBody>
+                  <a:tcPr/>
+                </a:tc>
+                <a:extLst>
+                  <a:ext uri="{0D108BD9-81ED-4DB2-BD59-A6C34878D82A}">
+                    <a16:rowId xmlns:a16="http://schemas.microsoft.com/office/drawing/2014/main" val="3124079957"/>
+                  </a:ext>
+                </a:extLst>
+              </a:tr>
+            </a:tbl>
+          </a:graphicData>
+        </a:graphic>
+      </p:graphicFrame>
+      <p:sp>
+        <p:nvSpPr>
+          <p:cNvPr id="9" name="TextBox 8">
+            <a:extLst>
+              <a:ext uri="{FF2B5EF4-FFF2-40B4-BE49-F238E27FC236}">
+                <a16:creationId xmlns:a16="http://schemas.microsoft.com/office/drawing/2014/main" id="{F0DAA674-2986-CAC1-C19A-D908787855B6}"/>
+              </a:ext>
+            </a:extLst>
+          </p:cNvPr>
+          <p:cNvSpPr txBox="1"/>
+          <p:nvPr/>
+        </p:nvSpPr>
+        <p:spPr>
+          <a:xfrm>
+            <a:off x="496956" y="3429000"/>
+            <a:ext cx="5818068" cy="369332"/>
+          </a:xfrm>
+          <a:prstGeom prst="rect">
+            <a:avLst/>
+          </a:prstGeom>
+          <a:noFill/>
+        </p:spPr>
+        <p:txBody>
+          <a:bodyPr wrap="none" rtlCol="0">
+            <a:spAutoFit/>
+          </a:bodyPr>
+          <a:lstStyle/>
+          <a:p>
+            <a:pPr marL="285750" indent="-285750">
+              <a:buFont typeface="Arial" panose="020B0604020202020204" pitchFamily="34" charset="0"/>
+              <a:buChar char="•"/>
+            </a:pPr>
+            <a:r>
+              <a:rPr lang="en-US" dirty="0"/>
+              <a:t>Trade-off between interpretability and predictive power?</a:t>
+            </a:r>
+          </a:p>
+        </p:txBody>
+      </p:sp>
+    </p:spTree>
+    <p:extLst>
+      <p:ext uri="{BB962C8B-B14F-4D97-AF65-F5344CB8AC3E}">
+        <p14:creationId xmlns:p14="http://schemas.microsoft.com/office/powerpoint/2010/main" val="1608503649"/>
+      </p:ext>
+    </p:extLst>
+  </p:cSld>
+  <p:clrMapOvr>
+    <a:masterClrMapping/>
+  </p:clrMapOvr>
+</p:sld>
+</file>
+
+<file path=ppt/slides/slide6.xml><?xml version="1.0" encoding="utf-8"?>
+<p:sld xmlns:a="http://schemas.openxmlformats.org/drawingml/2006/main" xmlns:r="http://schemas.openxmlformats.org/officeDocument/2006/relationships" xmlns:p="http://schemas.openxmlformats.org/presentationml/2006/main">
+  <p:cSld>
+    <p:spTree>
+      <p:nvGrpSpPr>
+        <p:cNvPr id="1" name=""/>
+        <p:cNvGrpSpPr/>
+        <p:nvPr/>
+      </p:nvGrpSpPr>
+      <p:grpSpPr>
+        <a:xfrm>
+          <a:off x="0" y="0"/>
+          <a:ext cx="0" cy="0"/>
+          <a:chOff x="0" y="0"/>
+          <a:chExt cx="0" cy="0"/>
+        </a:xfrm>
+      </p:grpSpPr>
+      <p:sp>
+        <p:nvSpPr>
+          <p:cNvPr id="2" name="Title 1">
+            <a:extLst>
+              <a:ext uri="{FF2B5EF4-FFF2-40B4-BE49-F238E27FC236}">
+                <a16:creationId xmlns:a16="http://schemas.microsoft.com/office/drawing/2014/main" id="{1BE11FB9-9866-0851-FAB9-AFD52983141A}"/>
+              </a:ext>
+            </a:extLst>
+          </p:cNvPr>
+          <p:cNvSpPr>
+            <a:spLocks noGrp="1"/>
+          </p:cNvSpPr>
+          <p:nvPr>
+            <p:ph type="title"/>
+          </p:nvPr>
+        </p:nvSpPr>
+        <p:spPr>
+          <a:xfrm>
+            <a:off x="-68826" y="0"/>
+            <a:ext cx="10515600" cy="1325563"/>
+          </a:xfrm>
+        </p:spPr>
+        <p:txBody>
+          <a:bodyPr/>
+          <a:lstStyle/>
+          <a:p>
+            <a:r>
+              <a:rPr lang="en-US" dirty="0"/>
+              <a:t>CDC Classifier Time Period</a:t>
+            </a:r>
+          </a:p>
+        </p:txBody>
+      </p:sp>
+      <p:graphicFrame>
+        <p:nvGraphicFramePr>
+          <p:cNvPr id="4" name="Table 4">
+            <a:extLst>
+              <a:ext uri="{FF2B5EF4-FFF2-40B4-BE49-F238E27FC236}">
+                <a16:creationId xmlns:a16="http://schemas.microsoft.com/office/drawing/2014/main" id="{39C0B844-C61B-078C-08FF-F34D9A4AC574}"/>
+              </a:ext>
+            </a:extLst>
+          </p:cNvPr>
+          <p:cNvGraphicFramePr>
+            <a:graphicFrameLocks noGrp="1"/>
+          </p:cNvGraphicFramePr>
+          <p:nvPr>
+            <p:extLst>
+              <p:ext uri="{D42A27DB-BD31-4B8C-83A1-F6EECF244321}">
+                <p14:modId xmlns:p14="http://schemas.microsoft.com/office/powerpoint/2010/main" val="206688987"/>
+              </p:ext>
+            </p:extLst>
+          </p:nvPr>
+        </p:nvGraphicFramePr>
+        <p:xfrm>
+          <a:off x="4637548" y="1214232"/>
+          <a:ext cx="5519175" cy="2011680"/>
+        </p:xfrm>
+        <a:graphic>
+          <a:graphicData uri="http://schemas.openxmlformats.org/drawingml/2006/table">
+            <a:tbl>
+              <a:tblPr firstRow="1" bandRow="1">
+                <a:tableStyleId>{2D5ABB26-0587-4C30-8999-92F81FD0307C}</a:tableStyleId>
+              </a:tblPr>
+              <a:tblGrid>
+                <a:gridCol w="1839725">
+                  <a:extLst>
+                    <a:ext uri="{9D8B030D-6E8A-4147-A177-3AD203B41FA5}">
+                      <a16:colId xmlns:a16="http://schemas.microsoft.com/office/drawing/2014/main" val="3116723693"/>
+                    </a:ext>
+                  </a:extLst>
+                </a:gridCol>
+                <a:gridCol w="1839725">
+                  <a:extLst>
+                    <a:ext uri="{9D8B030D-6E8A-4147-A177-3AD203B41FA5}">
+                      <a16:colId xmlns:a16="http://schemas.microsoft.com/office/drawing/2014/main" val="4242942700"/>
+                    </a:ext>
+                  </a:extLst>
+                </a:gridCol>
+                <a:gridCol w="1839725">
+                  <a:extLst>
+                    <a:ext uri="{9D8B030D-6E8A-4147-A177-3AD203B41FA5}">
+                      <a16:colId xmlns:a16="http://schemas.microsoft.com/office/drawing/2014/main" val="3674775602"/>
+                    </a:ext>
+                  </a:extLst>
+                </a:gridCol>
+              </a:tblGrid>
+              <a:tr h="471594">
+                <a:tc>
+                  <a:txBody>
+                    <a:bodyPr/>
+                    <a:lstStyle/>
+                    <a:p>
+                      <a:endParaRPr lang="en-US" dirty="0"/>
+                    </a:p>
+                  </a:txBody>
+                  <a:tcPr>
+                    <a:lnR w="12700" cap="flat" cmpd="sng" algn="ctr">
+                      <a:solidFill>
+                        <a:schemeClr val="tx1"/>
+                      </a:solidFill>
+                      <a:prstDash val="solid"/>
+                      <a:round/>
+                      <a:headEnd type="none" w="med" len="med"/>
+                      <a:tailEnd type="none" w="med" len="med"/>
+                    </a:lnR>
+                    <a:lnB w="12700" cap="flat" cmpd="sng" algn="ctr">
+                      <a:solidFill>
+                        <a:schemeClr val="tx1"/>
+                      </a:solidFill>
+                      <a:prstDash val="solid"/>
+                      <a:round/>
+                      <a:headEnd type="none" w="med" len="med"/>
+                      <a:tailEnd type="none" w="med" len="med"/>
+                    </a:lnB>
+                  </a:tcPr>
+                </a:tc>
+                <a:tc>
+                  <a:txBody>
+                    <a:bodyPr/>
+                    <a:lstStyle/>
+                    <a:p>
+                      <a:r>
+                        <a:rPr lang="en-US" dirty="0"/>
+                        <a:t>CDC Time Period (% exceeded)</a:t>
+                      </a:r>
+                    </a:p>
+                  </a:txBody>
+                  <a:tcPr>
+                    <a:lnL w="12700" cap="flat" cmpd="sng" algn="ctr">
+                      <a:solidFill>
+                        <a:schemeClr val="tx1"/>
+                      </a:solidFill>
+                      <a:prstDash val="solid"/>
+                      <a:round/>
+                      <a:headEnd type="none" w="med" len="med"/>
+                      <a:tailEnd type="none" w="med" len="med"/>
+                    </a:lnL>
+                    <a:lnR w="12700" cap="flat" cmpd="sng" algn="ctr">
+                      <a:solidFill>
+                        <a:schemeClr val="tx1"/>
+                      </a:solidFill>
+                      <a:prstDash val="solid"/>
+                      <a:round/>
+                      <a:headEnd type="none" w="med" len="med"/>
+                      <a:tailEnd type="none" w="med" len="med"/>
+                    </a:lnR>
+                    <a:lnB w="12700" cap="flat" cmpd="sng" algn="ctr">
+                      <a:solidFill>
+                        <a:schemeClr val="tx1"/>
+                      </a:solidFill>
+                      <a:prstDash val="solid"/>
+                      <a:round/>
+                      <a:headEnd type="none" w="med" len="med"/>
+                      <a:tailEnd type="none" w="med" len="med"/>
+                    </a:lnB>
+                  </a:tcPr>
+                </a:tc>
+                <a:tc>
+                  <a:txBody>
+                    <a:bodyPr/>
+                    <a:lstStyle/>
+                    <a:p>
+                      <a:r>
+                        <a:rPr lang="en-US" dirty="0"/>
+                        <a:t>Entire 123-period (% exceeded)</a:t>
+                      </a:r>
+                    </a:p>
+                  </a:txBody>
+                  <a:tcPr>
+                    <a:lnL w="12700" cap="flat" cmpd="sng" algn="ctr">
+                      <a:solidFill>
+                        <a:schemeClr val="tx1"/>
+                      </a:solidFill>
+                      <a:prstDash val="solid"/>
+                      <a:round/>
+                      <a:headEnd type="none" w="med" len="med"/>
+                      <a:tailEnd type="none" w="med" len="med"/>
+                    </a:lnL>
+                    <a:lnB w="12700" cap="flat" cmpd="sng" algn="ctr">
+                      <a:solidFill>
+                        <a:schemeClr val="tx1"/>
+                      </a:solidFill>
+                      <a:prstDash val="solid"/>
+                      <a:round/>
+                      <a:headEnd type="none" w="med" len="med"/>
+                      <a:tailEnd type="none" w="med" len="med"/>
+                    </a:lnB>
+                  </a:tcPr>
+                </a:tc>
+                <a:extLst>
+                  <a:ext uri="{0D108BD9-81ED-4DB2-BD59-A6C34878D82A}">
+                    <a16:rowId xmlns:a16="http://schemas.microsoft.com/office/drawing/2014/main" val="1250064366"/>
+                  </a:ext>
+                </a:extLst>
+              </a:tr>
+              <a:tr h="273225">
+                <a:tc>
+                  <a:txBody>
+                    <a:bodyPr/>
+                    <a:lstStyle/>
+                    <a:p>
+                      <a:r>
+                        <a:rPr lang="en-US" dirty="0"/>
+                        <a:t>High</a:t>
+                      </a:r>
+                    </a:p>
+                  </a:txBody>
+                  <a:tcPr>
+                    <a:lnR w="12700" cap="flat" cmpd="sng" algn="ctr">
+                      <a:solidFill>
+                        <a:schemeClr val="tx1"/>
+                      </a:solidFill>
+                      <a:prstDash val="solid"/>
+                      <a:round/>
+                      <a:headEnd type="none" w="med" len="med"/>
+                      <a:tailEnd type="none" w="med" len="med"/>
+                    </a:lnR>
+                    <a:lnT w="12700" cap="flat" cmpd="sng" algn="ctr">
+                      <a:solidFill>
+                        <a:schemeClr val="tx1"/>
+                      </a:solidFill>
+                      <a:prstDash val="solid"/>
+                      <a:round/>
+                      <a:headEnd type="none" w="med" len="med"/>
+                      <a:tailEnd type="none" w="med" len="med"/>
+                    </a:lnT>
+                    <a:lnB w="12700" cap="flat" cmpd="sng" algn="ctr">
+                      <a:solidFill>
+                        <a:schemeClr val="tx1"/>
+                      </a:solidFill>
+                      <a:prstDash val="solid"/>
+                      <a:round/>
+                      <a:headEnd type="none" w="med" len="med"/>
+                      <a:tailEnd type="none" w="med" len="med"/>
+                    </a:lnB>
+                  </a:tcPr>
+                </a:tc>
+                <a:tc>
+                  <a:txBody>
+                    <a:bodyPr/>
+                    <a:lstStyle/>
+                    <a:p>
+                      <a:r>
+                        <a:rPr lang="en-US" dirty="0"/>
+                        <a:t>81.1</a:t>
+                      </a:r>
+                    </a:p>
+                  </a:txBody>
+                  <a:tcPr>
+                    <a:lnL w="12700" cap="flat" cmpd="sng" algn="ctr">
+                      <a:solidFill>
+                        <a:schemeClr val="tx1"/>
+                      </a:solidFill>
+                      <a:prstDash val="solid"/>
+                      <a:round/>
+                      <a:headEnd type="none" w="med" len="med"/>
+                      <a:tailEnd type="none" w="med" len="med"/>
+                    </a:lnL>
+                    <a:lnR w="12700" cap="flat" cmpd="sng" algn="ctr">
+                      <a:solidFill>
+                        <a:schemeClr val="tx1"/>
+                      </a:solidFill>
+                      <a:prstDash val="solid"/>
+                      <a:round/>
+                      <a:headEnd type="none" w="med" len="med"/>
+                      <a:tailEnd type="none" w="med" len="med"/>
+                    </a:lnR>
+                    <a:lnT w="12700" cap="flat" cmpd="sng" algn="ctr">
+                      <a:solidFill>
+                        <a:schemeClr val="tx1"/>
+                      </a:solidFill>
+                      <a:prstDash val="solid"/>
+                      <a:round/>
+                      <a:headEnd type="none" w="med" len="med"/>
+                      <a:tailEnd type="none" w="med" len="med"/>
+                    </a:lnT>
+                    <a:lnB w="12700" cap="flat" cmpd="sng" algn="ctr">
+                      <a:solidFill>
+                        <a:schemeClr val="tx1"/>
+                      </a:solidFill>
+                      <a:prstDash val="solid"/>
+                      <a:round/>
+                      <a:headEnd type="none" w="med" len="med"/>
+                      <a:tailEnd type="none" w="med" len="med"/>
+                    </a:lnB>
+                  </a:tcPr>
+                </a:tc>
+                <a:tc>
+                  <a:txBody>
+                    <a:bodyPr/>
+                    <a:lstStyle/>
+                    <a:p>
+                      <a:r>
+                        <a:rPr lang="en-US" dirty="0"/>
+                        <a:t>69.7</a:t>
+                      </a:r>
+                    </a:p>
+                  </a:txBody>
+                  <a:tcPr>
+                    <a:lnL w="12700" cap="flat" cmpd="sng" algn="ctr">
+                      <a:solidFill>
+                        <a:schemeClr val="tx1"/>
+                      </a:solidFill>
+                      <a:prstDash val="solid"/>
+                      <a:round/>
+                      <a:headEnd type="none" w="med" len="med"/>
+                      <a:tailEnd type="none" w="med" len="med"/>
+                    </a:lnL>
+                    <a:lnT w="12700" cap="flat" cmpd="sng" algn="ctr">
+                      <a:solidFill>
+                        <a:schemeClr val="tx1"/>
+                      </a:solidFill>
+                      <a:prstDash val="solid"/>
+                      <a:round/>
+                      <a:headEnd type="none" w="med" len="med"/>
+                      <a:tailEnd type="none" w="med" len="med"/>
+                    </a:lnT>
+                    <a:lnB w="12700" cap="flat" cmpd="sng" algn="ctr">
+                      <a:solidFill>
+                        <a:schemeClr val="tx1"/>
+                      </a:solidFill>
+                      <a:prstDash val="solid"/>
+                      <a:round/>
+                      <a:headEnd type="none" w="med" len="med"/>
+                      <a:tailEnd type="none" w="med" len="med"/>
+                    </a:lnB>
+                  </a:tcPr>
+                </a:tc>
+                <a:extLst>
+                  <a:ext uri="{0D108BD9-81ED-4DB2-BD59-A6C34878D82A}">
+                    <a16:rowId xmlns:a16="http://schemas.microsoft.com/office/drawing/2014/main" val="2887904651"/>
+                  </a:ext>
+                </a:extLst>
+              </a:tr>
+              <a:tr h="471594">
+                <a:tc>
+                  <a:txBody>
+                    <a:bodyPr/>
+                    <a:lstStyle/>
+                    <a:p>
+                      <a:pPr marL="0" marR="0" lvl="0" indent="0" algn="l" defTabSz="914400" rtl="0" eaLnBrk="1" fontAlgn="auto" latinLnBrk="0" hangingPunct="1">
+                        <a:lnSpc>
+                          <a:spcPct val="100000"/>
+                        </a:lnSpc>
+                        <a:spcBef>
+                          <a:spcPts val="0"/>
+                        </a:spcBef>
+                        <a:spcAft>
+                          <a:spcPts val="0"/>
+                        </a:spcAft>
+                        <a:buClrTx/>
+                        <a:buSzTx/>
+                        <a:buFontTx/>
+                        <a:buNone/>
+                        <a:tabLst/>
+                        <a:defRPr/>
+                      </a:pPr>
+                      <a:r>
+                        <a:rPr lang="en-US" dirty="0"/>
+                        <a:t>Medium</a:t>
+                      </a:r>
+                    </a:p>
+                    <a:p>
+                      <a:endParaRPr lang="en-US" dirty="0"/>
+                    </a:p>
+                  </a:txBody>
+                  <a:tcPr>
+                    <a:lnR w="12700" cap="flat" cmpd="sng" algn="ctr">
+                      <a:solidFill>
+                        <a:schemeClr val="tx1"/>
+                      </a:solidFill>
+                      <a:prstDash val="solid"/>
+                      <a:round/>
+                      <a:headEnd type="none" w="med" len="med"/>
+                      <a:tailEnd type="none" w="med" len="med"/>
+                    </a:lnR>
+                    <a:lnT w="12700" cap="flat" cmpd="sng" algn="ctr">
+                      <a:solidFill>
+                        <a:schemeClr val="tx1"/>
+                      </a:solidFill>
+                      <a:prstDash val="solid"/>
+                      <a:round/>
+                      <a:headEnd type="none" w="med" len="med"/>
+                      <a:tailEnd type="none" w="med" len="med"/>
+                    </a:lnT>
+                    <a:lnB w="12700" cap="flat" cmpd="sng" algn="ctr">
+                      <a:solidFill>
+                        <a:schemeClr val="tx1"/>
+                      </a:solidFill>
+                      <a:prstDash val="solid"/>
+                      <a:round/>
+                      <a:headEnd type="none" w="med" len="med"/>
+                      <a:tailEnd type="none" w="med" len="med"/>
+                    </a:lnB>
+                  </a:tcPr>
+                </a:tc>
+                <a:tc>
+                  <a:txBody>
+                    <a:bodyPr/>
+                    <a:lstStyle/>
+                    <a:p>
+                      <a:r>
+                        <a:rPr lang="en-US" dirty="0"/>
+                        <a:t>85.5</a:t>
+                      </a:r>
+                    </a:p>
+                  </a:txBody>
+                  <a:tcPr>
+                    <a:lnL w="12700" cap="flat" cmpd="sng" algn="ctr">
+                      <a:solidFill>
+                        <a:schemeClr val="tx1"/>
+                      </a:solidFill>
+                      <a:prstDash val="solid"/>
+                      <a:round/>
+                      <a:headEnd type="none" w="med" len="med"/>
+                      <a:tailEnd type="none" w="med" len="med"/>
+                    </a:lnL>
+                    <a:lnR w="12700" cap="flat" cmpd="sng" algn="ctr">
+                      <a:solidFill>
+                        <a:schemeClr val="tx1"/>
+                      </a:solidFill>
+                      <a:prstDash val="solid"/>
+                      <a:round/>
+                      <a:headEnd type="none" w="med" len="med"/>
+                      <a:tailEnd type="none" w="med" len="med"/>
+                    </a:lnR>
+                    <a:lnT w="12700" cap="flat" cmpd="sng" algn="ctr">
+                      <a:solidFill>
+                        <a:schemeClr val="tx1"/>
+                      </a:solidFill>
+                      <a:prstDash val="solid"/>
+                      <a:round/>
+                      <a:headEnd type="none" w="med" len="med"/>
+                      <a:tailEnd type="none" w="med" len="med"/>
+                    </a:lnT>
+                    <a:lnB w="12700" cap="flat" cmpd="sng" algn="ctr">
+                      <a:solidFill>
+                        <a:schemeClr val="tx1"/>
+                      </a:solidFill>
+                      <a:prstDash val="solid"/>
+                      <a:round/>
+                      <a:headEnd type="none" w="med" len="med"/>
+                      <a:tailEnd type="none" w="med" len="med"/>
+                    </a:lnB>
+                  </a:tcPr>
+                </a:tc>
+                <a:tc>
+                  <a:txBody>
+                    <a:bodyPr/>
+                    <a:lstStyle/>
+                    <a:p>
+                      <a:r>
+                        <a:rPr lang="en-US" dirty="0"/>
+                        <a:t>66.0</a:t>
+                      </a:r>
+                    </a:p>
+                  </a:txBody>
+                  <a:tcPr>
+                    <a:lnL w="12700" cap="flat" cmpd="sng" algn="ctr">
+                      <a:solidFill>
+                        <a:schemeClr val="tx1"/>
+                      </a:solidFill>
+                      <a:prstDash val="solid"/>
+                      <a:round/>
+                      <a:headEnd type="none" w="med" len="med"/>
+                      <a:tailEnd type="none" w="med" len="med"/>
+                    </a:lnL>
+                    <a:lnT w="12700" cap="flat" cmpd="sng" algn="ctr">
+                      <a:solidFill>
+                        <a:schemeClr val="tx1"/>
+                      </a:solidFill>
+                      <a:prstDash val="solid"/>
+                      <a:round/>
+                      <a:headEnd type="none" w="med" len="med"/>
+                      <a:tailEnd type="none" w="med" len="med"/>
+                    </a:lnT>
+                    <a:lnB w="12700" cap="flat" cmpd="sng" algn="ctr">
+                      <a:solidFill>
+                        <a:schemeClr val="tx1"/>
+                      </a:solidFill>
+                      <a:prstDash val="solid"/>
+                      <a:round/>
+                      <a:headEnd type="none" w="med" len="med"/>
+                      <a:tailEnd type="none" w="med" len="med"/>
+                    </a:lnB>
+                  </a:tcPr>
+                </a:tc>
+                <a:extLst>
+                  <a:ext uri="{0D108BD9-81ED-4DB2-BD59-A6C34878D82A}">
+                    <a16:rowId xmlns:a16="http://schemas.microsoft.com/office/drawing/2014/main" val="807313533"/>
+                  </a:ext>
+                </a:extLst>
+              </a:tr>
+              <a:tr h="273225">
+                <a:tc>
+                  <a:txBody>
+                    <a:bodyPr/>
+                    <a:lstStyle/>
+                    <a:p>
+                      <a:r>
+                        <a:rPr lang="en-US" dirty="0"/>
+                        <a:t>Low</a:t>
+                      </a:r>
+                    </a:p>
+                  </a:txBody>
+                  <a:tcPr>
+                    <a:lnR w="12700" cap="flat" cmpd="sng" algn="ctr">
+                      <a:solidFill>
+                        <a:schemeClr val="tx1"/>
+                      </a:solidFill>
+                      <a:prstDash val="solid"/>
+                      <a:round/>
+                      <a:headEnd type="none" w="med" len="med"/>
+                      <a:tailEnd type="none" w="med" len="med"/>
+                    </a:lnR>
+                    <a:lnT w="12700" cap="flat" cmpd="sng" algn="ctr">
+                      <a:solidFill>
+                        <a:schemeClr val="tx1"/>
+                      </a:solidFill>
+                      <a:prstDash val="solid"/>
+                      <a:round/>
+                      <a:headEnd type="none" w="med" len="med"/>
+                      <a:tailEnd type="none" w="med" len="med"/>
+                    </a:lnT>
+                  </a:tcPr>
+                </a:tc>
+                <a:tc>
+                  <a:txBody>
+                    <a:bodyPr/>
+                    <a:lstStyle/>
+                    <a:p>
+                      <a:r>
+                        <a:rPr lang="en-US" dirty="0"/>
+                        <a:t>71.0</a:t>
+                      </a:r>
+                    </a:p>
+                  </a:txBody>
+                  <a:tcPr>
+                    <a:lnL w="12700" cap="flat" cmpd="sng" algn="ctr">
+                      <a:solidFill>
+                        <a:schemeClr val="tx1"/>
+                      </a:solidFill>
+                      <a:prstDash val="solid"/>
+                      <a:round/>
+                      <a:headEnd type="none" w="med" len="med"/>
+                      <a:tailEnd type="none" w="med" len="med"/>
+                    </a:lnL>
+                    <a:lnR w="12700" cap="flat" cmpd="sng" algn="ctr">
+                      <a:solidFill>
+                        <a:schemeClr val="tx1"/>
+                      </a:solidFill>
+                      <a:prstDash val="solid"/>
+                      <a:round/>
+                      <a:headEnd type="none" w="med" len="med"/>
+                      <a:tailEnd type="none" w="med" len="med"/>
+                    </a:lnR>
+                    <a:lnT w="12700" cap="flat" cmpd="sng" algn="ctr">
+                      <a:solidFill>
+                        <a:schemeClr val="tx1"/>
+                      </a:solidFill>
+                      <a:prstDash val="solid"/>
+                      <a:round/>
+                      <a:headEnd type="none" w="med" len="med"/>
+                      <a:tailEnd type="none" w="med" len="med"/>
+                    </a:lnT>
+                  </a:tcPr>
+                </a:tc>
+                <a:tc>
+                  <a:txBody>
+                    <a:bodyPr/>
+                    <a:lstStyle/>
+                    <a:p>
+                      <a:r>
+                        <a:rPr lang="en-US" dirty="0"/>
+                        <a:t>63.8</a:t>
+                      </a:r>
+                    </a:p>
+                  </a:txBody>
+                  <a:tcPr>
+                    <a:lnL w="12700" cap="flat" cmpd="sng" algn="ctr">
+                      <a:solidFill>
+                        <a:schemeClr val="tx1"/>
+                      </a:solidFill>
+                      <a:prstDash val="solid"/>
+                      <a:round/>
+                      <a:headEnd type="none" w="med" len="med"/>
+                      <a:tailEnd type="none" w="med" len="med"/>
+                    </a:lnL>
+                    <a:lnT w="12700" cap="flat" cmpd="sng" algn="ctr">
+                      <a:solidFill>
+                        <a:schemeClr val="tx1"/>
+                      </a:solidFill>
+                      <a:prstDash val="solid"/>
+                      <a:round/>
+                      <a:headEnd type="none" w="med" len="med"/>
+                      <a:tailEnd type="none" w="med" len="med"/>
+                    </a:lnT>
+                  </a:tcPr>
+                </a:tc>
+                <a:extLst>
+                  <a:ext uri="{0D108BD9-81ED-4DB2-BD59-A6C34878D82A}">
+                    <a16:rowId xmlns:a16="http://schemas.microsoft.com/office/drawing/2014/main" val="421382557"/>
+                  </a:ext>
+                </a:extLst>
+              </a:tr>
+            </a:tbl>
+          </a:graphicData>
+        </a:graphic>
+      </p:graphicFrame>
+      <p:sp>
+        <p:nvSpPr>
+          <p:cNvPr id="7" name="TextBox 6">
+            <a:extLst>
+              <a:ext uri="{FF2B5EF4-FFF2-40B4-BE49-F238E27FC236}">
+                <a16:creationId xmlns:a16="http://schemas.microsoft.com/office/drawing/2014/main" id="{C8137926-2022-63B2-4E52-A7BC5B430A55}"/>
+              </a:ext>
+            </a:extLst>
+          </p:cNvPr>
+          <p:cNvSpPr txBox="1"/>
+          <p:nvPr/>
+        </p:nvSpPr>
+        <p:spPr>
+          <a:xfrm>
+            <a:off x="609600" y="1465006"/>
+            <a:ext cx="3578942" cy="2031325"/>
+          </a:xfrm>
+          <a:prstGeom prst="rect">
+            <a:avLst/>
+          </a:prstGeom>
+          <a:noFill/>
+        </p:spPr>
+        <p:txBody>
+          <a:bodyPr wrap="square" rtlCol="0">
+            <a:spAutoFit/>
+          </a:bodyPr>
+          <a:lstStyle/>
+          <a:p>
+            <a:pPr marL="285750" indent="-285750">
+              <a:buFont typeface="Arial" panose="020B0604020202020204" pitchFamily="34" charset="0"/>
+              <a:buChar char="•"/>
+            </a:pPr>
+            <a:r>
+              <a:rPr lang="en-US" dirty="0"/>
+              <a:t>Using only the CDC period improves predictions for “High”, but also increases the false negatives (low + high)</a:t>
+            </a:r>
+          </a:p>
+          <a:p>
+            <a:pPr marL="285750" indent="-285750">
+              <a:buFont typeface="Arial" panose="020B0604020202020204" pitchFamily="34" charset="0"/>
+              <a:buChar char="•"/>
+            </a:pPr>
+            <a:endParaRPr lang="en-US" dirty="0"/>
+          </a:p>
+          <a:p>
+            <a:pPr marL="285750" indent="-285750">
+              <a:buFont typeface="Arial" panose="020B0604020202020204" pitchFamily="34" charset="0"/>
+              <a:buChar char="•"/>
+            </a:pPr>
+            <a:r>
+              <a:rPr lang="en-US" dirty="0"/>
+              <a:t>Community Levels stopped surge in omicron cases</a:t>
+            </a:r>
+          </a:p>
+        </p:txBody>
+      </p:sp>
+      <p:pic>
+        <p:nvPicPr>
+          <p:cNvPr id="9" name="Picture 8" descr="A group of graphs showing different colors&#10;&#10;Description automatically generated">
+            <a:extLst>
+              <a:ext uri="{FF2B5EF4-FFF2-40B4-BE49-F238E27FC236}">
+                <a16:creationId xmlns:a16="http://schemas.microsoft.com/office/drawing/2014/main" id="{15545B32-20CC-A233-774A-C39666484696}"/>
+              </a:ext>
+            </a:extLst>
+          </p:cNvPr>
+          <p:cNvPicPr>
+            <a:picLocks noChangeAspect="1"/>
+          </p:cNvPicPr>
+          <p:nvPr/>
+        </p:nvPicPr>
+        <p:blipFill>
+          <a:blip r:embed="rId2"/>
+          <a:stretch>
+            <a:fillRect/>
+          </a:stretch>
+        </p:blipFill>
+        <p:spPr>
+          <a:xfrm>
+            <a:off x="2448232" y="3429000"/>
+            <a:ext cx="6351641" cy="3175821"/>
+          </a:xfrm>
+          <a:prstGeom prst="rect">
+            <a:avLst/>
+          </a:prstGeom>
         </p:spPr>
       </p:pic>
     </p:spTree>
     <p:extLst>
       <p:ext uri="{BB962C8B-B14F-4D97-AF65-F5344CB8AC3E}">
-        <p14:creationId xmlns:p14="http://schemas.microsoft.com/office/powerpoint/2010/main" val="4206618820"/>
+        <p14:creationId xmlns:p14="http://schemas.microsoft.com/office/powerpoint/2010/main" val="841970627"/>
+      </p:ext>
+    </p:extLst>
+  </p:cSld>
+  <p:clrMapOvr>
+    <a:masterClrMapping/>
+  </p:clrMapOvr>
+</p:sld>
+</file>
+
+<file path=ppt/slides/slide7.xml><?xml version="1.0" encoding="utf-8"?>
+<p:sld xmlns:a="http://schemas.openxmlformats.org/drawingml/2006/main" xmlns:r="http://schemas.openxmlformats.org/officeDocument/2006/relationships" xmlns:p="http://schemas.openxmlformats.org/presentationml/2006/main">
+  <p:cSld>
+    <p:spTree>
+      <p:nvGrpSpPr>
+        <p:cNvPr id="1" name=""/>
+        <p:cNvGrpSpPr/>
+        <p:nvPr/>
+      </p:nvGrpSpPr>
+      <p:grpSpPr>
+        <a:xfrm>
+          <a:off x="0" y="0"/>
+          <a:ext cx="0" cy="0"/>
+          <a:chOff x="0" y="0"/>
+          <a:chExt cx="0" cy="0"/>
+        </a:xfrm>
+      </p:grpSpPr>
+      <p:sp>
+        <p:nvSpPr>
+          <p:cNvPr id="2" name="Title 1">
+            <a:extLst>
+              <a:ext uri="{FF2B5EF4-FFF2-40B4-BE49-F238E27FC236}">
+                <a16:creationId xmlns:a16="http://schemas.microsoft.com/office/drawing/2014/main" id="{1D03C129-54CE-F853-29CD-491F85819D9C}"/>
+              </a:ext>
+            </a:extLst>
+          </p:cNvPr>
+          <p:cNvSpPr>
+            <a:spLocks noGrp="1"/>
+          </p:cNvSpPr>
+          <p:nvPr>
+            <p:ph type="title"/>
+          </p:nvPr>
+        </p:nvSpPr>
+        <p:spPr>
+          <a:xfrm>
+            <a:off x="0" y="18255"/>
+            <a:ext cx="10515600" cy="1325563"/>
+          </a:xfrm>
+        </p:spPr>
+        <p:txBody>
+          <a:bodyPr/>
+          <a:lstStyle/>
+          <a:p>
+            <a:r>
+              <a:rPr lang="en-US" dirty="0"/>
+              <a:t>Strain-specific train/test periods</a:t>
+            </a:r>
+          </a:p>
+        </p:txBody>
+      </p:sp>
+      <p:sp>
+        <p:nvSpPr>
+          <p:cNvPr id="3" name="Content Placeholder 2">
+            <a:extLst>
+              <a:ext uri="{FF2B5EF4-FFF2-40B4-BE49-F238E27FC236}">
+                <a16:creationId xmlns:a16="http://schemas.microsoft.com/office/drawing/2014/main" id="{4E46E7C2-1E8B-9BD6-781B-63FA0E406180}"/>
+              </a:ext>
+            </a:extLst>
+          </p:cNvPr>
+          <p:cNvSpPr>
+            <a:spLocks noGrp="1"/>
+          </p:cNvSpPr>
+          <p:nvPr>
+            <p:ph idx="1"/>
+          </p:nvPr>
+        </p:nvSpPr>
+        <p:spPr>
+          <a:xfrm>
+            <a:off x="651388" y="1137367"/>
+            <a:ext cx="10515600" cy="4351338"/>
+          </a:xfrm>
+        </p:spPr>
+        <p:txBody>
+          <a:bodyPr/>
+          <a:lstStyle/>
+          <a:p>
+            <a:r>
+              <a:rPr lang="en-US" dirty="0"/>
+              <a:t>Used all data up to two weeks before it became “dominant” strain </a:t>
+            </a:r>
+          </a:p>
+        </p:txBody>
+      </p:sp>
+      <p:pic>
+        <p:nvPicPr>
+          <p:cNvPr id="13" name="Picture 12" descr="A group of graphs showing different colors&#10;&#10;Description automatically generated">
+            <a:extLst>
+              <a:ext uri="{FF2B5EF4-FFF2-40B4-BE49-F238E27FC236}">
+                <a16:creationId xmlns:a16="http://schemas.microsoft.com/office/drawing/2014/main" id="{24E36874-FAC2-06FC-0A9E-0354B22E5A2A}"/>
+              </a:ext>
+            </a:extLst>
+          </p:cNvPr>
+          <p:cNvPicPr>
+            <a:picLocks noChangeAspect="1"/>
+          </p:cNvPicPr>
+          <p:nvPr/>
+        </p:nvPicPr>
+        <p:blipFill>
+          <a:blip r:embed="rId2"/>
+          <a:stretch>
+            <a:fillRect/>
+          </a:stretch>
+        </p:blipFill>
+        <p:spPr>
+          <a:xfrm>
+            <a:off x="1025012" y="2001131"/>
+            <a:ext cx="9021319" cy="4510660"/>
+          </a:xfrm>
+          <a:prstGeom prst="rect">
+            <a:avLst/>
+          </a:prstGeom>
+        </p:spPr>
+      </p:pic>
+    </p:spTree>
+    <p:extLst>
+      <p:ext uri="{BB962C8B-B14F-4D97-AF65-F5344CB8AC3E}">
+        <p14:creationId xmlns:p14="http://schemas.microsoft.com/office/powerpoint/2010/main" val="3705701666"/>
+      </p:ext>
+    </p:extLst>
+  </p:cSld>
+  <p:clrMapOvr>
+    <a:masterClrMapping/>
+  </p:clrMapOvr>
+</p:sld>
+</file>
+
+<file path=ppt/slides/slide8.xml><?xml version="1.0" encoding="utf-8"?>
+<p:sld xmlns:a="http://schemas.openxmlformats.org/drawingml/2006/main" xmlns:r="http://schemas.openxmlformats.org/officeDocument/2006/relationships" xmlns:p="http://schemas.openxmlformats.org/presentationml/2006/main">
+  <p:cSld>
+    <p:spTree>
+      <p:nvGrpSpPr>
+        <p:cNvPr id="1" name=""/>
+        <p:cNvGrpSpPr/>
+        <p:nvPr/>
+      </p:nvGrpSpPr>
+      <p:grpSpPr>
+        <a:xfrm>
+          <a:off x="0" y="0"/>
+          <a:ext cx="0" cy="0"/>
+          <a:chOff x="0" y="0"/>
+          <a:chExt cx="0" cy="0"/>
+        </a:xfrm>
+      </p:grpSpPr>
+      <p:sp>
+        <p:nvSpPr>
+          <p:cNvPr id="2" name="Title 1">
+            <a:extLst>
+              <a:ext uri="{FF2B5EF4-FFF2-40B4-BE49-F238E27FC236}">
+                <a16:creationId xmlns:a16="http://schemas.microsoft.com/office/drawing/2014/main" id="{1D03C129-54CE-F853-29CD-491F85819D9C}"/>
+              </a:ext>
+            </a:extLst>
+          </p:cNvPr>
+          <p:cNvSpPr>
+            <a:spLocks noGrp="1"/>
+          </p:cNvSpPr>
+          <p:nvPr>
+            <p:ph type="title"/>
+          </p:nvPr>
+        </p:nvSpPr>
+        <p:spPr>
+          <a:xfrm>
+            <a:off x="0" y="18255"/>
+            <a:ext cx="10515600" cy="1325563"/>
+          </a:xfrm>
+        </p:spPr>
+        <p:txBody>
+          <a:bodyPr/>
+          <a:lstStyle/>
+          <a:p>
+            <a:r>
+              <a:rPr lang="en-US" dirty="0"/>
+              <a:t>Strain-specific train/test periods</a:t>
+            </a:r>
+          </a:p>
+        </p:txBody>
+      </p:sp>
+      <p:sp>
+        <p:nvSpPr>
+          <p:cNvPr id="3" name="Content Placeholder 2">
+            <a:extLst>
+              <a:ext uri="{FF2B5EF4-FFF2-40B4-BE49-F238E27FC236}">
+                <a16:creationId xmlns:a16="http://schemas.microsoft.com/office/drawing/2014/main" id="{4E46E7C2-1E8B-9BD6-781B-63FA0E406180}"/>
+              </a:ext>
+            </a:extLst>
+          </p:cNvPr>
+          <p:cNvSpPr>
+            <a:spLocks noGrp="1"/>
+          </p:cNvSpPr>
+          <p:nvPr>
+            <p:ph idx="1"/>
+          </p:nvPr>
+        </p:nvSpPr>
+        <p:spPr>
+          <a:xfrm>
+            <a:off x="651388" y="1137367"/>
+            <a:ext cx="10515600" cy="4351338"/>
+          </a:xfrm>
+        </p:spPr>
+        <p:txBody>
+          <a:bodyPr/>
+          <a:lstStyle/>
+          <a:p>
+            <a:r>
+              <a:rPr lang="en-US" dirty="0"/>
+              <a:t>Used all data up to two weeks before it became “dominant” strain </a:t>
+            </a:r>
+          </a:p>
+          <a:p>
+            <a:r>
+              <a:rPr lang="en-US" dirty="0"/>
+              <a:t>Does a model built w/o data on a strain still predict well? </a:t>
+            </a:r>
+          </a:p>
+        </p:txBody>
+      </p:sp>
+      <p:grpSp>
+        <p:nvGrpSpPr>
+          <p:cNvPr id="11" name="Group 10">
+            <a:extLst>
+              <a:ext uri="{FF2B5EF4-FFF2-40B4-BE49-F238E27FC236}">
+                <a16:creationId xmlns:a16="http://schemas.microsoft.com/office/drawing/2014/main" id="{D94893D9-B9FC-9D66-3BCF-BF43876A327A}"/>
+              </a:ext>
+            </a:extLst>
+          </p:cNvPr>
+          <p:cNvGrpSpPr/>
+          <p:nvPr/>
+        </p:nvGrpSpPr>
+        <p:grpSpPr>
+          <a:xfrm>
+            <a:off x="570272" y="2659572"/>
+            <a:ext cx="7482348" cy="3257705"/>
+            <a:chOff x="2202426" y="2462928"/>
+            <a:chExt cx="6581131" cy="2836658"/>
+          </a:xfrm>
+        </p:grpSpPr>
+        <p:grpSp>
+          <p:nvGrpSpPr>
+            <p:cNvPr id="9" name="Group 8">
+              <a:extLst>
+                <a:ext uri="{FF2B5EF4-FFF2-40B4-BE49-F238E27FC236}">
+                  <a16:creationId xmlns:a16="http://schemas.microsoft.com/office/drawing/2014/main" id="{5C4117CA-6278-302A-B4C0-B09AD267AB26}"/>
+                </a:ext>
+              </a:extLst>
+            </p:cNvPr>
+            <p:cNvGrpSpPr/>
+            <p:nvPr/>
+          </p:nvGrpSpPr>
+          <p:grpSpPr>
+            <a:xfrm>
+              <a:off x="2202426" y="2462929"/>
+              <a:ext cx="6581131" cy="2836657"/>
+              <a:chOff x="2202426" y="2462929"/>
+              <a:chExt cx="6581131" cy="2836657"/>
+            </a:xfrm>
+          </p:grpSpPr>
+          <p:pic>
+            <p:nvPicPr>
+              <p:cNvPr id="5" name="Picture 4" descr="A diagram of a diagram&#10;&#10;Description automatically generated">
+                <a:extLst>
+                  <a:ext uri="{FF2B5EF4-FFF2-40B4-BE49-F238E27FC236}">
+                    <a16:creationId xmlns:a16="http://schemas.microsoft.com/office/drawing/2014/main" id="{B829EEE9-D53C-B865-0639-1FEACFE53944}"/>
+                  </a:ext>
+                </a:extLst>
+              </p:cNvPr>
+              <p:cNvPicPr>
+                <a:picLocks noChangeAspect="1"/>
+              </p:cNvPicPr>
+              <p:nvPr/>
+            </p:nvPicPr>
+            <p:blipFill rotWithShape="1">
+              <a:blip r:embed="rId2"/>
+              <a:srcRect l="48758" t="19930" b="13595"/>
+              <a:stretch/>
+            </p:blipFill>
+            <p:spPr>
+              <a:xfrm>
+                <a:off x="4807974" y="2462929"/>
+                <a:ext cx="3975583" cy="2836657"/>
+              </a:xfrm>
+              <a:prstGeom prst="rect">
+                <a:avLst/>
+              </a:prstGeom>
+            </p:spPr>
+          </p:pic>
+          <p:sp>
+            <p:nvSpPr>
+              <p:cNvPr id="6" name="Rectangle 5">
+                <a:extLst>
+                  <a:ext uri="{FF2B5EF4-FFF2-40B4-BE49-F238E27FC236}">
+                    <a16:creationId xmlns:a16="http://schemas.microsoft.com/office/drawing/2014/main" id="{BE124D4E-FFBF-BEC7-63CC-78A507B1AF10}"/>
+                  </a:ext>
+                </a:extLst>
+              </p:cNvPr>
+              <p:cNvSpPr/>
+              <p:nvPr/>
+            </p:nvSpPr>
+            <p:spPr>
+              <a:xfrm>
+                <a:off x="2202426" y="2615381"/>
+                <a:ext cx="403122" cy="314632"/>
+              </a:xfrm>
+              <a:prstGeom prst="rect">
+                <a:avLst/>
+              </a:prstGeom>
+              <a:solidFill>
+                <a:schemeClr val="bg1"/>
+              </a:solidFill>
+              <a:ln>
+                <a:noFill/>
+              </a:ln>
+            </p:spPr>
+            <p:style>
+              <a:lnRef idx="2">
+                <a:schemeClr val="accent1">
+                  <a:shade val="50000"/>
+                </a:schemeClr>
+              </a:lnRef>
+              <a:fillRef idx="1">
+                <a:schemeClr val="accent1"/>
+              </a:fillRef>
+              <a:effectRef idx="0">
+                <a:schemeClr val="accent1"/>
+              </a:effectRef>
+              <a:fontRef idx="minor">
+                <a:schemeClr val="lt1"/>
+              </a:fontRef>
+            </p:style>
+            <p:txBody>
+              <a:bodyPr rtlCol="0" anchor="ctr"/>
+              <a:lstStyle/>
+              <a:p>
+                <a:pPr algn="ctr"/>
+                <a:endParaRPr lang="en-US"/>
+              </a:p>
+            </p:txBody>
+          </p:sp>
+          <p:sp>
+            <p:nvSpPr>
+              <p:cNvPr id="7" name="Rectangle 6">
+                <a:extLst>
+                  <a:ext uri="{FF2B5EF4-FFF2-40B4-BE49-F238E27FC236}">
+                    <a16:creationId xmlns:a16="http://schemas.microsoft.com/office/drawing/2014/main" id="{70F9E80A-506F-191E-9E62-C4D2578CDF64}"/>
+                  </a:ext>
+                </a:extLst>
+              </p:cNvPr>
+              <p:cNvSpPr/>
+              <p:nvPr/>
+            </p:nvSpPr>
+            <p:spPr>
+              <a:xfrm flipV="1">
+                <a:off x="6877662" y="2635046"/>
+                <a:ext cx="245807" cy="235974"/>
+              </a:xfrm>
+              <a:prstGeom prst="rect">
+                <a:avLst/>
+              </a:prstGeom>
+              <a:solidFill>
+                <a:schemeClr val="bg1"/>
+              </a:solidFill>
+              <a:ln>
+                <a:noFill/>
+              </a:ln>
+            </p:spPr>
+            <p:style>
+              <a:lnRef idx="2">
+                <a:schemeClr val="accent1">
+                  <a:shade val="50000"/>
+                </a:schemeClr>
+              </a:lnRef>
+              <a:fillRef idx="1">
+                <a:schemeClr val="accent1"/>
+              </a:fillRef>
+              <a:effectRef idx="0">
+                <a:schemeClr val="accent1"/>
+              </a:effectRef>
+              <a:fontRef idx="minor">
+                <a:schemeClr val="lt1"/>
+              </a:fontRef>
+            </p:style>
+            <p:txBody>
+              <a:bodyPr rtlCol="0" anchor="ctr"/>
+              <a:lstStyle/>
+              <a:p>
+                <a:pPr algn="ctr"/>
+                <a:endParaRPr lang="en-US"/>
+              </a:p>
+            </p:txBody>
+          </p:sp>
+          <p:sp>
+            <p:nvSpPr>
+              <p:cNvPr id="8" name="Rectangle 7">
+                <a:extLst>
+                  <a:ext uri="{FF2B5EF4-FFF2-40B4-BE49-F238E27FC236}">
+                    <a16:creationId xmlns:a16="http://schemas.microsoft.com/office/drawing/2014/main" id="{C67830C0-9CFB-DEB9-6E98-A25B8F77E34B}"/>
+                  </a:ext>
+                </a:extLst>
+              </p:cNvPr>
+              <p:cNvSpPr/>
+              <p:nvPr/>
+            </p:nvSpPr>
+            <p:spPr>
+              <a:xfrm flipV="1">
+                <a:off x="6956322" y="2654710"/>
+                <a:ext cx="245807" cy="235974"/>
+              </a:xfrm>
+              <a:prstGeom prst="rect">
+                <a:avLst/>
+              </a:prstGeom>
+              <a:solidFill>
+                <a:schemeClr val="bg1"/>
+              </a:solidFill>
+              <a:ln>
+                <a:noFill/>
+              </a:ln>
+            </p:spPr>
+            <p:style>
+              <a:lnRef idx="2">
+                <a:schemeClr val="accent1">
+                  <a:shade val="50000"/>
+                </a:schemeClr>
+              </a:lnRef>
+              <a:fillRef idx="1">
+                <a:schemeClr val="accent1"/>
+              </a:fillRef>
+              <a:effectRef idx="0">
+                <a:schemeClr val="accent1"/>
+              </a:effectRef>
+              <a:fontRef idx="minor">
+                <a:schemeClr val="lt1"/>
+              </a:fontRef>
+            </p:style>
+            <p:txBody>
+              <a:bodyPr rtlCol="0" anchor="ctr"/>
+              <a:lstStyle/>
+              <a:p>
+                <a:pPr algn="ctr"/>
+                <a:endParaRPr lang="en-US"/>
+              </a:p>
+            </p:txBody>
+          </p:sp>
+        </p:grpSp>
+        <p:pic>
+          <p:nvPicPr>
+            <p:cNvPr id="10" name="Picture 9">
+              <a:extLst>
+                <a:ext uri="{FF2B5EF4-FFF2-40B4-BE49-F238E27FC236}">
+                  <a16:creationId xmlns:a16="http://schemas.microsoft.com/office/drawing/2014/main" id="{9B46879B-A393-1DC1-9C20-896E0222FCEA}"/>
+                </a:ext>
+              </a:extLst>
+            </p:cNvPr>
+            <p:cNvPicPr>
+              <a:picLocks noChangeAspect="1"/>
+            </p:cNvPicPr>
+            <p:nvPr/>
+          </p:nvPicPr>
+          <p:blipFill>
+            <a:blip r:embed="rId3"/>
+            <a:stretch>
+              <a:fillRect/>
+            </a:stretch>
+          </p:blipFill>
+          <p:spPr>
+            <a:xfrm>
+              <a:off x="2215449" y="2462928"/>
+              <a:ext cx="2513865" cy="2836657"/>
+            </a:xfrm>
+            <a:prstGeom prst="rect">
+              <a:avLst/>
+            </a:prstGeom>
+          </p:spPr>
+        </p:pic>
+      </p:grpSp>
+      <p:sp>
+        <p:nvSpPr>
+          <p:cNvPr id="12" name="TextBox 11">
+            <a:extLst>
+              <a:ext uri="{FF2B5EF4-FFF2-40B4-BE49-F238E27FC236}">
+                <a16:creationId xmlns:a16="http://schemas.microsoft.com/office/drawing/2014/main" id="{0E10842A-A6BE-7253-F6F4-CB7FBC331477}"/>
+              </a:ext>
+            </a:extLst>
+          </p:cNvPr>
+          <p:cNvSpPr txBox="1"/>
+          <p:nvPr/>
+        </p:nvSpPr>
+        <p:spPr>
+          <a:xfrm>
+            <a:off x="8142051" y="2778600"/>
+            <a:ext cx="2712024" cy="369332"/>
+          </a:xfrm>
+          <a:prstGeom prst="rect">
+            <a:avLst/>
+          </a:prstGeom>
+          <a:noFill/>
+        </p:spPr>
+        <p:txBody>
+          <a:bodyPr wrap="none" rtlCol="0">
+            <a:spAutoFit/>
+          </a:bodyPr>
+          <a:lstStyle/>
+          <a:p>
+            <a:r>
+              <a:rPr lang="en-US" dirty="0"/>
+              <a:t>Robust even to new strains</a:t>
+            </a:r>
+          </a:p>
+        </p:txBody>
+      </p:sp>
+    </p:spTree>
+    <p:extLst>
+      <p:ext uri="{BB962C8B-B14F-4D97-AF65-F5344CB8AC3E}">
+        <p14:creationId xmlns:p14="http://schemas.microsoft.com/office/powerpoint/2010/main" val="1193538261"/>
       </p:ext>
     </p:extLst>
   </p:cSld>

</xml_diff>

<commit_message>
Decision trees for delta and omicron
</commit_message>
<xml_diff>
--- a/Graphs/Decision_tree_self_graph.pptx
+++ b/Graphs/Decision_tree_self_graph.pptx
@@ -7,12 +7,13 @@
   <p:sldIdLst>
     <p:sldId id="260" r:id="rId2"/>
     <p:sldId id="261" r:id="rId3"/>
-    <p:sldId id="262" r:id="rId4"/>
-    <p:sldId id="258" r:id="rId5"/>
-    <p:sldId id="259" r:id="rId6"/>
-    <p:sldId id="264" r:id="rId7"/>
-    <p:sldId id="263" r:id="rId8"/>
-    <p:sldId id="265" r:id="rId9"/>
+    <p:sldId id="266" r:id="rId4"/>
+    <p:sldId id="262" r:id="rId5"/>
+    <p:sldId id="258" r:id="rId6"/>
+    <p:sldId id="259" r:id="rId7"/>
+    <p:sldId id="264" r:id="rId8"/>
+    <p:sldId id="263" r:id="rId9"/>
+    <p:sldId id="265" r:id="rId10"/>
   </p:sldIdLst>
   <p:sldSz cx="12192000" cy="6858000"/>
   <p:notesSz cx="6858000" cy="9144000"/>
@@ -3599,7 +3600,7 @@
           <p:cNvPr id="2" name="Title 1">
             <a:extLst>
               <a:ext uri="{FF2B5EF4-FFF2-40B4-BE49-F238E27FC236}">
-                <a16:creationId xmlns:a16="http://schemas.microsoft.com/office/drawing/2014/main" id="{30A86A5B-63D3-460F-9750-DA6B254BA9B9}"/>
+                <a16:creationId xmlns:a16="http://schemas.microsoft.com/office/drawing/2014/main" id="{5ABBB784-B465-6058-57E0-1D6B95FE453B}"/>
               </a:ext>
             </a:extLst>
           </p:cNvPr>
@@ -3622,17 +3623,17 @@
           <a:p>
             <a:r>
               <a:rPr lang="en-US" dirty="0"/>
-              <a:t>Complexity vs performance </a:t>
+              <a:t>Decision tree performance</a:t>
             </a:r>
           </a:p>
         </p:txBody>
       </p:sp>
       <p:pic>
         <p:nvPicPr>
-          <p:cNvPr id="4" name="Picture 3" descr="A diagram of a company&#10;&#10;Description automatically generated">
-            <a:extLst>
-              <a:ext uri="{FF2B5EF4-FFF2-40B4-BE49-F238E27FC236}">
-                <a16:creationId xmlns:a16="http://schemas.microsoft.com/office/drawing/2014/main" id="{C65ABD30-F932-FB99-763A-82115878AE65}"/>
+          <p:cNvPr id="4" name="Picture 3">
+            <a:extLst>
+              <a:ext uri="{FF2B5EF4-FFF2-40B4-BE49-F238E27FC236}">
+                <a16:creationId xmlns:a16="http://schemas.microsoft.com/office/drawing/2014/main" id="{C334128E-7D41-25B6-403A-E842F0DC1FD3}"/>
               </a:ext>
             </a:extLst>
           </p:cNvPr>
@@ -3649,91 +3650,18 @@
         </p:blipFill>
         <p:spPr>
           <a:xfrm>
-            <a:off x="295786" y="1413772"/>
-            <a:ext cx="9640448" cy="1870201"/>
+            <a:off x="1156252" y="1343818"/>
+            <a:ext cx="7772400" cy="2658014"/>
           </a:xfrm>
           <a:prstGeom prst="rect">
             <a:avLst/>
           </a:prstGeom>
         </p:spPr>
       </p:pic>
-      <p:sp>
-        <p:nvSpPr>
-          <p:cNvPr id="6" name="TextBox 5">
-            <a:extLst>
-              <a:ext uri="{FF2B5EF4-FFF2-40B4-BE49-F238E27FC236}">
-                <a16:creationId xmlns:a16="http://schemas.microsoft.com/office/drawing/2014/main" id="{8F858D68-BE80-09EC-C566-B8599F2BE5C6}"/>
-              </a:ext>
-            </a:extLst>
-          </p:cNvPr>
-          <p:cNvSpPr txBox="1"/>
-          <p:nvPr/>
-        </p:nvSpPr>
-        <p:spPr>
-          <a:xfrm>
-            <a:off x="295786" y="3726388"/>
-            <a:ext cx="5260258" cy="1754326"/>
-          </a:xfrm>
-          <a:prstGeom prst="rect">
-            <a:avLst/>
-          </a:prstGeom>
-          <a:noFill/>
-        </p:spPr>
-        <p:txBody>
-          <a:bodyPr wrap="square" rtlCol="0">
-            <a:spAutoFit/>
-          </a:bodyPr>
-          <a:lstStyle/>
-          <a:p>
-            <a:pPr marL="285750" indent="-285750">
-              <a:buFont typeface="Arial" panose="020B0604020202020204" pitchFamily="34" charset="0"/>
-              <a:buChar char="•"/>
-            </a:pPr>
-            <a:r>
-              <a:rPr lang="en-US" dirty="0"/>
-              <a:t>“Full” classifier, 3-week period </a:t>
-            </a:r>
-          </a:p>
-          <a:p>
-            <a:pPr marL="285750" indent="-285750">
-              <a:buFont typeface="Arial" panose="020B0604020202020204" pitchFamily="34" charset="0"/>
-              <a:buChar char="•"/>
-            </a:pPr>
-            <a:r>
-              <a:rPr lang="en-US" dirty="0"/>
-              <a:t>Cost complexity pruning using 10-fold cross validation</a:t>
-            </a:r>
-          </a:p>
-          <a:p>
-            <a:pPr marL="285750" indent="-285750">
-              <a:buFont typeface="Arial" panose="020B0604020202020204" pitchFamily="34" charset="0"/>
-              <a:buChar char="•"/>
-            </a:pPr>
-            <a:r>
-              <a:rPr lang="en-US" dirty="0"/>
-              <a:t>Harder to interpret…</a:t>
-            </a:r>
-          </a:p>
-          <a:p>
-            <a:pPr marL="285750" indent="-285750">
-              <a:buFont typeface="Arial" panose="020B0604020202020204" pitchFamily="34" charset="0"/>
-              <a:buChar char="•"/>
-            </a:pPr>
-            <a:endParaRPr lang="en-US" dirty="0"/>
-          </a:p>
-          <a:p>
-            <a:pPr marL="285750" indent="-285750">
-              <a:buFont typeface="Arial" panose="020B0604020202020204" pitchFamily="34" charset="0"/>
-              <a:buChar char="•"/>
-            </a:pPr>
-            <a:endParaRPr lang="en-US" dirty="0"/>
-          </a:p>
-        </p:txBody>
-      </p:sp>
     </p:spTree>
     <p:extLst>
       <p:ext uri="{BB962C8B-B14F-4D97-AF65-F5344CB8AC3E}">
-        <p14:creationId xmlns:p14="http://schemas.microsoft.com/office/powerpoint/2010/main" val="4127999338"/>
+        <p14:creationId xmlns:p14="http://schemas.microsoft.com/office/powerpoint/2010/main" val="246438033"/>
       </p:ext>
     </p:extLst>
   </p:cSld>
@@ -3760,6 +3688,172 @@
           <a:chExt cx="0" cy="0"/>
         </a:xfrm>
       </p:grpSpPr>
+      <p:sp>
+        <p:nvSpPr>
+          <p:cNvPr id="2" name="Title 1">
+            <a:extLst>
+              <a:ext uri="{FF2B5EF4-FFF2-40B4-BE49-F238E27FC236}">
+                <a16:creationId xmlns:a16="http://schemas.microsoft.com/office/drawing/2014/main" id="{30A86A5B-63D3-460F-9750-DA6B254BA9B9}"/>
+              </a:ext>
+            </a:extLst>
+          </p:cNvPr>
+          <p:cNvSpPr>
+            <a:spLocks noGrp="1"/>
+          </p:cNvSpPr>
+          <p:nvPr>
+            <p:ph type="title"/>
+          </p:nvPr>
+        </p:nvSpPr>
+        <p:spPr>
+          <a:xfrm>
+            <a:off x="0" y="18255"/>
+            <a:ext cx="10515600" cy="1325563"/>
+          </a:xfrm>
+        </p:spPr>
+        <p:txBody>
+          <a:bodyPr/>
+          <a:lstStyle/>
+          <a:p>
+            <a:r>
+              <a:rPr lang="en-US" dirty="0"/>
+              <a:t>Complexity vs performance </a:t>
+            </a:r>
+          </a:p>
+        </p:txBody>
+      </p:sp>
+      <p:pic>
+        <p:nvPicPr>
+          <p:cNvPr id="4" name="Picture 3" descr="A diagram of a company&#10;&#10;Description automatically generated">
+            <a:extLst>
+              <a:ext uri="{FF2B5EF4-FFF2-40B4-BE49-F238E27FC236}">
+                <a16:creationId xmlns:a16="http://schemas.microsoft.com/office/drawing/2014/main" id="{C65ABD30-F932-FB99-763A-82115878AE65}"/>
+              </a:ext>
+            </a:extLst>
+          </p:cNvPr>
+          <p:cNvPicPr>
+            <a:picLocks noChangeAspect="1"/>
+          </p:cNvPicPr>
+          <p:nvPr/>
+        </p:nvPicPr>
+        <p:blipFill>
+          <a:blip r:embed="rId2"/>
+          <a:stretch>
+            <a:fillRect/>
+          </a:stretch>
+        </p:blipFill>
+        <p:spPr>
+          <a:xfrm>
+            <a:off x="295786" y="1413772"/>
+            <a:ext cx="9640448" cy="1870201"/>
+          </a:xfrm>
+          <a:prstGeom prst="rect">
+            <a:avLst/>
+          </a:prstGeom>
+        </p:spPr>
+      </p:pic>
+      <p:sp>
+        <p:nvSpPr>
+          <p:cNvPr id="6" name="TextBox 5">
+            <a:extLst>
+              <a:ext uri="{FF2B5EF4-FFF2-40B4-BE49-F238E27FC236}">
+                <a16:creationId xmlns:a16="http://schemas.microsoft.com/office/drawing/2014/main" id="{8F858D68-BE80-09EC-C566-B8599F2BE5C6}"/>
+              </a:ext>
+            </a:extLst>
+          </p:cNvPr>
+          <p:cNvSpPr txBox="1"/>
+          <p:nvPr/>
+        </p:nvSpPr>
+        <p:spPr>
+          <a:xfrm>
+            <a:off x="295786" y="3726388"/>
+            <a:ext cx="5260258" cy="1754326"/>
+          </a:xfrm>
+          <a:prstGeom prst="rect">
+            <a:avLst/>
+          </a:prstGeom>
+          <a:noFill/>
+        </p:spPr>
+        <p:txBody>
+          <a:bodyPr wrap="square" rtlCol="0">
+            <a:spAutoFit/>
+          </a:bodyPr>
+          <a:lstStyle/>
+          <a:p>
+            <a:pPr marL="285750" indent="-285750">
+              <a:buFont typeface="Arial" panose="020B0604020202020204" pitchFamily="34" charset="0"/>
+              <a:buChar char="•"/>
+            </a:pPr>
+            <a:r>
+              <a:rPr lang="en-US" dirty="0"/>
+              <a:t>“Full” classifier, 3-week period </a:t>
+            </a:r>
+          </a:p>
+          <a:p>
+            <a:pPr marL="285750" indent="-285750">
+              <a:buFont typeface="Arial" panose="020B0604020202020204" pitchFamily="34" charset="0"/>
+              <a:buChar char="•"/>
+            </a:pPr>
+            <a:r>
+              <a:rPr lang="en-US" dirty="0"/>
+              <a:t>Cost complexity pruning using 10-fold cross validation</a:t>
+            </a:r>
+          </a:p>
+          <a:p>
+            <a:pPr marL="285750" indent="-285750">
+              <a:buFont typeface="Arial" panose="020B0604020202020204" pitchFamily="34" charset="0"/>
+              <a:buChar char="•"/>
+            </a:pPr>
+            <a:r>
+              <a:rPr lang="en-US" dirty="0"/>
+              <a:t>Harder to interpret…</a:t>
+            </a:r>
+          </a:p>
+          <a:p>
+            <a:pPr marL="285750" indent="-285750">
+              <a:buFont typeface="Arial" panose="020B0604020202020204" pitchFamily="34" charset="0"/>
+              <a:buChar char="•"/>
+            </a:pPr>
+            <a:endParaRPr lang="en-US" dirty="0"/>
+          </a:p>
+          <a:p>
+            <a:pPr marL="285750" indent="-285750">
+              <a:buFont typeface="Arial" panose="020B0604020202020204" pitchFamily="34" charset="0"/>
+              <a:buChar char="•"/>
+            </a:pPr>
+            <a:endParaRPr lang="en-US" dirty="0"/>
+          </a:p>
+        </p:txBody>
+      </p:sp>
+    </p:spTree>
+    <p:extLst>
+      <p:ext uri="{BB962C8B-B14F-4D97-AF65-F5344CB8AC3E}">
+        <p14:creationId xmlns:p14="http://schemas.microsoft.com/office/powerpoint/2010/main" val="4127999338"/>
+      </p:ext>
+    </p:extLst>
+  </p:cSld>
+  <p:clrMapOvr>
+    <a:masterClrMapping/>
+  </p:clrMapOvr>
+</p:sld>
+</file>
+
+<file path=ppt/slides/slide5.xml><?xml version="1.0" encoding="utf-8"?>
+<p:sld xmlns:a="http://schemas.openxmlformats.org/drawingml/2006/main" xmlns:r="http://schemas.openxmlformats.org/officeDocument/2006/relationships" xmlns:p="http://schemas.openxmlformats.org/presentationml/2006/main">
+  <p:cSld>
+    <p:spTree>
+      <p:nvGrpSpPr>
+        <p:cNvPr id="1" name=""/>
+        <p:cNvGrpSpPr/>
+        <p:nvPr/>
+      </p:nvGrpSpPr>
+      <p:grpSpPr>
+        <a:xfrm>
+          <a:off x="0" y="0"/>
+          <a:ext cx="0" cy="0"/>
+          <a:chOff x="0" y="0"/>
+          <a:chExt cx="0" cy="0"/>
+        </a:xfrm>
+      </p:grpSpPr>
       <p:pic>
         <p:nvPicPr>
           <p:cNvPr id="9" name="Picture 8" descr="A diagram of a data flow&#10;&#10;Description automatically generated with medium confidence">
@@ -3909,7 +4003,7 @@
 </p:sld>
 </file>
 
-<file path=ppt/slides/slide5.xml><?xml version="1.0" encoding="utf-8"?>
+<file path=ppt/slides/slide6.xml><?xml version="1.0" encoding="utf-8"?>
 <p:sld xmlns:a="http://schemas.openxmlformats.org/drawingml/2006/main" xmlns:r="http://schemas.openxmlformats.org/officeDocument/2006/relationships" xmlns:p="http://schemas.openxmlformats.org/presentationml/2006/main">
   <p:cSld>
     <p:spTree>
@@ -4465,7 +4559,7 @@
 </p:sld>
 </file>
 
-<file path=ppt/slides/slide6.xml><?xml version="1.0" encoding="utf-8"?>
+<file path=ppt/slides/slide7.xml><?xml version="1.0" encoding="utf-8"?>
 <p:sld xmlns:a="http://schemas.openxmlformats.org/drawingml/2006/main" xmlns:r="http://schemas.openxmlformats.org/officeDocument/2006/relationships" xmlns:p="http://schemas.openxmlformats.org/presentationml/2006/main">
   <p:cSld>
     <p:spTree>
@@ -5190,7 +5284,7 @@
 </p:sld>
 </file>
 
-<file path=ppt/slides/slide7.xml><?xml version="1.0" encoding="utf-8"?>
+<file path=ppt/slides/slide8.xml><?xml version="1.0" encoding="utf-8"?>
 <p:sld xmlns:a="http://schemas.openxmlformats.org/drawingml/2006/main" xmlns:r="http://schemas.openxmlformats.org/officeDocument/2006/relationships" xmlns:p="http://schemas.openxmlformats.org/presentationml/2006/main">
   <p:cSld>
     <p:spTree>
@@ -5316,7 +5410,7 @@
 </p:sld>
 </file>
 
-<file path=ppt/slides/slide8.xml><?xml version="1.0" encoding="utf-8"?>
+<file path=ppt/slides/slide9.xml><?xml version="1.0" encoding="utf-8"?>
 <p:sld xmlns:a="http://schemas.openxmlformats.org/drawingml/2006/main" xmlns:r="http://schemas.openxmlformats.org/officeDocument/2006/relationships" xmlns:p="http://schemas.openxmlformats.org/presentationml/2006/main">
   <p:cSld>
     <p:spTree>

</xml_diff>

<commit_message>
Changed to predict proba
</commit_message>
<xml_diff>
--- a/Graphs/Decision_tree_self_graph.pptx
+++ b/Graphs/Decision_tree_self_graph.pptx
@@ -4599,8 +4599,8 @@
         </p:nvSpPr>
         <p:spPr>
           <a:xfrm>
-            <a:off x="496956" y="3429000"/>
-            <a:ext cx="5818068" cy="369332"/>
+            <a:off x="487017" y="3576917"/>
+            <a:ext cx="5877122" cy="923330"/>
           </a:xfrm>
           <a:prstGeom prst="rect">
             <a:avLst/>
@@ -4621,6 +4621,28 @@
               <a:rPr lang="en-US" dirty="0"/>
               <a:t>Trade-off between interpretability and predictive power?</a:t>
             </a:r>
+          </a:p>
+          <a:p>
+            <a:pPr marL="285750" indent="-285750">
+              <a:buFont typeface="Arial" panose="020B0604020202020204" pitchFamily="34" charset="0"/>
+              <a:buChar char="•"/>
+            </a:pPr>
+            <a:endParaRPr lang="en-US" dirty="0"/>
+          </a:p>
+          <a:p>
+            <a:pPr marL="742950" lvl="1" indent="-285750">
+              <a:buFont typeface="Arial" panose="020B0604020202020204" pitchFamily="34" charset="0"/>
+              <a:buChar char="•"/>
+            </a:pPr>
+            <a:r>
+              <a:rPr lang="en-US" dirty="0"/>
+              <a:t>Other classifiers, within 0.05 for accuracy and </a:t>
+            </a:r>
+            <a:r>
+              <a:rPr lang="en-US" dirty="0" err="1"/>
+              <a:t>auROC</a:t>
+            </a:r>
+            <a:endParaRPr lang="en-US" dirty="0"/>
           </a:p>
         </p:txBody>
       </p:sp>

</xml_diff>